<commit_message>
update system use case diagram
</commit_message>
<xml_diff>
--- a/use cases/use_case_diagram_system.pptx
+++ b/use cases/use_case_diagram_system.pptx
@@ -112,10 +112,6 @@
     </p:ext>
   </p:extLst>
 </p:presentation>
-</file>
-
-<file path=ppt/revisionInfo.xml><?xml version="1.0" encoding="utf-8"?>
-<p1510:revInfo xmlns:a="http://schemas.openxmlformats.org/drawingml/2006/main" xmlns:r="http://schemas.openxmlformats.org/officeDocument/2006/relationships" xmlns:p1510="http://schemas.microsoft.com/office/powerpoint/2015/10/main"/>
 </file>
 
 <file path=ppt/slideLayouts/slideLayout1.xml><?xml version="1.0" encoding="utf-8"?>
@@ -6586,18 +6582,17 @@
           <a:p>
             <a:pPr algn="ctr"/>
             <a:r>
-              <a:rPr lang="en-US" sz="1200" dirty="0" smtClean="0"/>
+              <a:rPr lang="en-US" sz="1200" dirty="0"/>
               <a:t>CPS</a:t>
             </a:r>
             <a:r>
-              <a:rPr lang="he-IL" sz="1200" dirty="0" smtClean="0"/>
+              <a:rPr lang="he-IL" sz="1200" dirty="0"/>
               <a:t> – </a:t>
             </a:r>
             <a:r>
-              <a:rPr lang="en-US" sz="1200" dirty="0" smtClean="0"/>
+              <a:rPr lang="en-US" sz="1200" dirty="0"/>
               <a:t>Car Park System</a:t>
             </a:r>
-            <a:endParaRPr lang="en-US" sz="1200" dirty="0"/>
           </a:p>
         </p:txBody>
       </p:sp>
@@ -6651,7 +6646,7 @@
         </p:nvGrpSpPr>
         <p:grpSpPr>
           <a:xfrm>
-            <a:off x="10987545" y="1572416"/>
+            <a:off x="11313140" y="3042995"/>
             <a:ext cx="878757" cy="1318492"/>
             <a:chOff x="166889" y="2680448"/>
             <a:chExt cx="1064478" cy="1597149"/>
@@ -7234,7 +7229,7 @@
         </p:nvGrpSpPr>
         <p:grpSpPr>
           <a:xfrm>
-            <a:off x="11025676" y="3277009"/>
+            <a:off x="11306028" y="1375748"/>
             <a:ext cx="878757" cy="1318492"/>
             <a:chOff x="166889" y="2680448"/>
             <a:chExt cx="1064478" cy="1597149"/>
@@ -7824,12 +7819,8 @@
           <a:lstStyle/>
           <a:p>
             <a:r>
-              <a:rPr lang="en-US" dirty="0" smtClean="0"/>
-              <a:t>System </a:t>
-            </a:r>
-            <a:r>
               <a:rPr lang="en-US" dirty="0"/>
-              <a:t>Level Use Case Diagram</a:t>
+              <a:t>System Level Use Case Diagram</a:t>
             </a:r>
           </a:p>
         </p:txBody>
@@ -7848,7 +7839,7 @@
         </p:nvSpPr>
         <p:spPr>
           <a:xfrm>
-            <a:off x="1969940" y="2252621"/>
+            <a:off x="5724327" y="2169820"/>
             <a:ext cx="1760527" cy="485809"/>
           </a:xfrm>
           <a:prstGeom prst="ellipse">
@@ -7903,7 +7894,7 @@
         </p:nvSpPr>
         <p:spPr>
           <a:xfrm>
-            <a:off x="1969940" y="2807255"/>
+            <a:off x="2535699" y="2980295"/>
             <a:ext cx="1760527" cy="485809"/>
           </a:xfrm>
           <a:prstGeom prst="ellipse">
@@ -7958,7 +7949,7 @@
         </p:nvSpPr>
         <p:spPr>
           <a:xfrm>
-            <a:off x="1969940" y="3373282"/>
+            <a:off x="5724326" y="2902539"/>
             <a:ext cx="1760527" cy="485809"/>
           </a:xfrm>
           <a:prstGeom prst="ellipse">
@@ -8123,7 +8114,7 @@
         </p:nvSpPr>
         <p:spPr>
           <a:xfrm>
-            <a:off x="8554986" y="3130377"/>
+            <a:off x="8592130" y="1704806"/>
             <a:ext cx="1760527" cy="485809"/>
           </a:xfrm>
           <a:prstGeom prst="ellipse">
@@ -8178,7 +8169,7 @@
         </p:nvSpPr>
         <p:spPr>
           <a:xfrm>
-            <a:off x="1969939" y="5312681"/>
+            <a:off x="2474164" y="4099754"/>
             <a:ext cx="1760527" cy="485809"/>
           </a:xfrm>
           <a:prstGeom prst="ellipse">
@@ -8233,7 +8224,7 @@
         </p:nvSpPr>
         <p:spPr>
           <a:xfrm>
-            <a:off x="1969939" y="5941013"/>
+            <a:off x="2513279" y="4875799"/>
             <a:ext cx="1760527" cy="485809"/>
           </a:xfrm>
           <a:prstGeom prst="ellipse">
@@ -8432,7 +8423,7 @@
           <a:p>
             <a:pPr algn="ctr"/>
             <a:r>
-              <a:rPr lang="he-IL" sz="1200" dirty="0" smtClean="0"/>
+              <a:rPr lang="he-IL" sz="1200" dirty="0"/>
               <a:t>אתחול המערכת</a:t>
             </a:r>
             <a:endParaRPr lang="en-US" sz="1200" dirty="0"/>
@@ -8487,7 +8478,7 @@
           <a:p>
             <a:pPr algn="ctr"/>
             <a:r>
-              <a:rPr lang="he-IL" sz="1200" dirty="0" smtClean="0"/>
+              <a:rPr lang="he-IL" sz="1200" dirty="0"/>
               <a:t>כיבוי המערכת</a:t>
             </a:r>
             <a:endParaRPr lang="en-US" sz="1200" dirty="0"/>
@@ -8542,7 +8533,7 @@
           <a:p>
             <a:pPr algn="ctr"/>
             <a:r>
-              <a:rPr lang="he-IL" sz="1200" dirty="0" smtClean="0"/>
+              <a:rPr lang="he-IL" sz="1200" dirty="0"/>
               <a:t>הפקת דו"חות נוספים</a:t>
             </a:r>
             <a:endParaRPr lang="en-US" sz="1200" dirty="0"/>
@@ -8563,7 +8554,7 @@
         </p:nvSpPr>
         <p:spPr>
           <a:xfrm>
-            <a:off x="1969939" y="3933587"/>
+            <a:off x="5724326" y="3841374"/>
             <a:ext cx="1760527" cy="485809"/>
           </a:xfrm>
           <a:prstGeom prst="ellipse">
@@ -8597,13 +8588,785 @@
           <a:p>
             <a:pPr algn="ctr"/>
             <a:r>
-              <a:rPr lang="he-IL" sz="1200" dirty="0" smtClean="0"/>
+              <a:rPr lang="he-IL" sz="1200" dirty="0"/>
               <a:t>שליחת תזכורת להזמנה</a:t>
             </a:r>
             <a:endParaRPr lang="en-US" sz="1200" dirty="0"/>
           </a:p>
         </p:txBody>
       </p:sp>
+      <p:cxnSp>
+        <p:nvCxnSpPr>
+          <p:cNvPr id="3" name="מחבר חץ ישר 2">
+            <a:extLst>
+              <a:ext uri="{FF2B5EF4-FFF2-40B4-BE49-F238E27FC236}">
+                <a16:creationId xmlns:a16="http://schemas.microsoft.com/office/drawing/2014/main" id="{80D650B0-7A91-471F-9449-777764849414}"/>
+              </a:ext>
+            </a:extLst>
+          </p:cNvPr>
+          <p:cNvCxnSpPr>
+            <a:cxnSpLocks/>
+          </p:cNvCxnSpPr>
+          <p:nvPr/>
+        </p:nvCxnSpPr>
+        <p:spPr>
+          <a:xfrm flipV="1">
+            <a:off x="1223881" y="2047465"/>
+            <a:ext cx="616494" cy="718994"/>
+          </a:xfrm>
+          <a:prstGeom prst="straightConnector1">
+            <a:avLst/>
+          </a:prstGeom>
+          <a:ln>
+            <a:tailEnd type="triangle"/>
+          </a:ln>
+        </p:spPr>
+        <p:style>
+          <a:lnRef idx="1">
+            <a:schemeClr val="accent1"/>
+          </a:lnRef>
+          <a:fillRef idx="0">
+            <a:schemeClr val="accent1"/>
+          </a:fillRef>
+          <a:effectRef idx="0">
+            <a:schemeClr val="accent1"/>
+          </a:effectRef>
+          <a:fontRef idx="minor">
+            <a:schemeClr val="tx1"/>
+          </a:fontRef>
+        </p:style>
+      </p:cxnSp>
+      <p:cxnSp>
+        <p:nvCxnSpPr>
+          <p:cNvPr id="15" name="מחבר חץ ישר 14">
+            <a:extLst>
+              <a:ext uri="{FF2B5EF4-FFF2-40B4-BE49-F238E27FC236}">
+                <a16:creationId xmlns:a16="http://schemas.microsoft.com/office/drawing/2014/main" id="{B82652E9-214C-421C-87DF-8864BD3B55D6}"/>
+              </a:ext>
+            </a:extLst>
+          </p:cNvPr>
+          <p:cNvCxnSpPr/>
+          <p:nvPr/>
+        </p:nvCxnSpPr>
+        <p:spPr>
+          <a:xfrm>
+            <a:off x="1191279" y="2701318"/>
+            <a:ext cx="1141020" cy="429059"/>
+          </a:xfrm>
+          <a:prstGeom prst="straightConnector1">
+            <a:avLst/>
+          </a:prstGeom>
+          <a:ln>
+            <a:tailEnd type="triangle"/>
+          </a:ln>
+        </p:spPr>
+        <p:style>
+          <a:lnRef idx="1">
+            <a:schemeClr val="accent1"/>
+          </a:lnRef>
+          <a:fillRef idx="0">
+            <a:schemeClr val="accent1"/>
+          </a:fillRef>
+          <a:effectRef idx="0">
+            <a:schemeClr val="accent1"/>
+          </a:effectRef>
+          <a:fontRef idx="minor">
+            <a:schemeClr val="tx1"/>
+          </a:fontRef>
+        </p:style>
+      </p:cxnSp>
+      <p:cxnSp>
+        <p:nvCxnSpPr>
+          <p:cNvPr id="17" name="מחבר ישר 16">
+            <a:extLst>
+              <a:ext uri="{FF2B5EF4-FFF2-40B4-BE49-F238E27FC236}">
+                <a16:creationId xmlns:a16="http://schemas.microsoft.com/office/drawing/2014/main" id="{50B47B84-CD92-4D94-9BA8-AF71D1884BA7}"/>
+              </a:ext>
+            </a:extLst>
+          </p:cNvPr>
+          <p:cNvCxnSpPr>
+            <a:stCxn id="66" idx="6"/>
+            <a:endCxn id="65" idx="2"/>
+          </p:cNvCxnSpPr>
+          <p:nvPr/>
+        </p:nvCxnSpPr>
+        <p:spPr>
+          <a:xfrm flipV="1">
+            <a:off x="4296226" y="2412725"/>
+            <a:ext cx="1428101" cy="810475"/>
+          </a:xfrm>
+          <a:prstGeom prst="line">
+            <a:avLst/>
+          </a:prstGeom>
+          <a:ln w="9525" cap="flat" cmpd="sng" algn="ctr">
+            <a:solidFill>
+              <a:schemeClr val="accent1"/>
+            </a:solidFill>
+            <a:prstDash val="dash"/>
+            <a:round/>
+            <a:headEnd type="none" w="med" len="med"/>
+            <a:tailEnd type="none" w="med" len="med"/>
+          </a:ln>
+        </p:spPr>
+        <p:style>
+          <a:lnRef idx="0">
+            <a:scrgbClr r="0" g="0" b="0"/>
+          </a:lnRef>
+          <a:fillRef idx="0">
+            <a:scrgbClr r="0" g="0" b="0"/>
+          </a:fillRef>
+          <a:effectRef idx="0">
+            <a:scrgbClr r="0" g="0" b="0"/>
+          </a:effectRef>
+          <a:fontRef idx="minor">
+            <a:schemeClr val="tx1"/>
+          </a:fontRef>
+        </p:style>
+      </p:cxnSp>
+      <p:cxnSp>
+        <p:nvCxnSpPr>
+          <p:cNvPr id="19" name="מחבר ישר 18">
+            <a:extLst>
+              <a:ext uri="{FF2B5EF4-FFF2-40B4-BE49-F238E27FC236}">
+                <a16:creationId xmlns:a16="http://schemas.microsoft.com/office/drawing/2014/main" id="{D07A65B8-9F59-449F-8BDC-C127B185ADDE}"/>
+              </a:ext>
+            </a:extLst>
+          </p:cNvPr>
+          <p:cNvCxnSpPr/>
+          <p:nvPr/>
+        </p:nvCxnSpPr>
+        <p:spPr>
+          <a:xfrm flipV="1">
+            <a:off x="4375230" y="3160297"/>
+            <a:ext cx="1267428" cy="114336"/>
+          </a:xfrm>
+          <a:prstGeom prst="line">
+            <a:avLst/>
+          </a:prstGeom>
+          <a:ln w="9525" cap="flat" cmpd="sng" algn="ctr">
+            <a:solidFill>
+              <a:schemeClr val="accent1"/>
+            </a:solidFill>
+            <a:prstDash val="dash"/>
+            <a:round/>
+            <a:headEnd type="none" w="med" len="med"/>
+            <a:tailEnd type="none" w="med" len="med"/>
+          </a:ln>
+        </p:spPr>
+        <p:style>
+          <a:lnRef idx="0">
+            <a:scrgbClr r="0" g="0" b="0"/>
+          </a:lnRef>
+          <a:fillRef idx="0">
+            <a:scrgbClr r="0" g="0" b="0"/>
+          </a:fillRef>
+          <a:effectRef idx="0">
+            <a:scrgbClr r="0" g="0" b="0"/>
+          </a:effectRef>
+          <a:fontRef idx="minor">
+            <a:schemeClr val="tx1"/>
+          </a:fontRef>
+        </p:style>
+      </p:cxnSp>
+      <p:cxnSp>
+        <p:nvCxnSpPr>
+          <p:cNvPr id="21" name="מחבר ישר 20">
+            <a:extLst>
+              <a:ext uri="{FF2B5EF4-FFF2-40B4-BE49-F238E27FC236}">
+                <a16:creationId xmlns:a16="http://schemas.microsoft.com/office/drawing/2014/main" id="{CA37950C-AACF-4937-B980-98AB6C246E45}"/>
+              </a:ext>
+            </a:extLst>
+          </p:cNvPr>
+          <p:cNvCxnSpPr/>
+          <p:nvPr/>
+        </p:nvCxnSpPr>
+        <p:spPr>
+          <a:xfrm>
+            <a:off x="4375230" y="3373281"/>
+            <a:ext cx="1186405" cy="648905"/>
+          </a:xfrm>
+          <a:prstGeom prst="line">
+            <a:avLst/>
+          </a:prstGeom>
+          <a:ln w="9525" cap="flat" cmpd="sng" algn="ctr">
+            <a:solidFill>
+              <a:schemeClr val="accent1"/>
+            </a:solidFill>
+            <a:prstDash val="dash"/>
+            <a:round/>
+            <a:headEnd type="none" w="med" len="med"/>
+            <a:tailEnd type="none" w="med" len="med"/>
+          </a:ln>
+        </p:spPr>
+        <p:style>
+          <a:lnRef idx="0">
+            <a:scrgbClr r="0" g="0" b="0"/>
+          </a:lnRef>
+          <a:fillRef idx="0">
+            <a:scrgbClr r="0" g="0" b="0"/>
+          </a:fillRef>
+          <a:effectRef idx="0">
+            <a:scrgbClr r="0" g="0" b="0"/>
+          </a:effectRef>
+          <a:fontRef idx="minor">
+            <a:schemeClr val="tx1"/>
+          </a:fontRef>
+        </p:style>
+      </p:cxnSp>
+      <p:cxnSp>
+        <p:nvCxnSpPr>
+          <p:cNvPr id="24" name="מחבר חץ ישר 23">
+            <a:extLst>
+              <a:ext uri="{FF2B5EF4-FFF2-40B4-BE49-F238E27FC236}">
+                <a16:creationId xmlns:a16="http://schemas.microsoft.com/office/drawing/2014/main" id="{BECD76D7-04E1-4433-84F6-98F5EB5FCAF4}"/>
+              </a:ext>
+            </a:extLst>
+          </p:cNvPr>
+          <p:cNvCxnSpPr>
+            <a:cxnSpLocks/>
+          </p:cNvCxnSpPr>
+          <p:nvPr/>
+        </p:nvCxnSpPr>
+        <p:spPr>
+          <a:xfrm flipH="1">
+            <a:off x="3507718" y="3510325"/>
+            <a:ext cx="2365" cy="553819"/>
+          </a:xfrm>
+          <a:prstGeom prst="straightConnector1">
+            <a:avLst/>
+          </a:prstGeom>
+          <a:ln w="9525" cap="flat" cmpd="sng" algn="ctr">
+            <a:solidFill>
+              <a:schemeClr val="accent1"/>
+            </a:solidFill>
+            <a:prstDash val="dash"/>
+            <a:round/>
+            <a:headEnd type="none" w="med" len="med"/>
+            <a:tailEnd type="none" w="med" len="med"/>
+          </a:ln>
+        </p:spPr>
+        <p:style>
+          <a:lnRef idx="0">
+            <a:scrgbClr r="0" g="0" b="0"/>
+          </a:lnRef>
+          <a:fillRef idx="0">
+            <a:scrgbClr r="0" g="0" b="0"/>
+          </a:fillRef>
+          <a:effectRef idx="0">
+            <a:scrgbClr r="0" g="0" b="0"/>
+          </a:effectRef>
+          <a:fontRef idx="minor">
+            <a:schemeClr val="tx1"/>
+          </a:fontRef>
+        </p:style>
+      </p:cxnSp>
+      <p:cxnSp>
+        <p:nvCxnSpPr>
+          <p:cNvPr id="68" name="מחבר חץ ישר 67">
+            <a:extLst>
+              <a:ext uri="{FF2B5EF4-FFF2-40B4-BE49-F238E27FC236}">
+                <a16:creationId xmlns:a16="http://schemas.microsoft.com/office/drawing/2014/main" id="{93FB5C31-3745-49ED-AAFF-332A8921C1EE}"/>
+              </a:ext>
+            </a:extLst>
+          </p:cNvPr>
+          <p:cNvCxnSpPr>
+            <a:cxnSpLocks/>
+          </p:cNvCxnSpPr>
+          <p:nvPr/>
+        </p:nvCxnSpPr>
+        <p:spPr>
+          <a:xfrm>
+            <a:off x="1188872" y="2675270"/>
+            <a:ext cx="1265159" cy="2296851"/>
+          </a:xfrm>
+          <a:prstGeom prst="straightConnector1">
+            <a:avLst/>
+          </a:prstGeom>
+          <a:ln>
+            <a:tailEnd type="triangle"/>
+          </a:ln>
+        </p:spPr>
+        <p:style>
+          <a:lnRef idx="1">
+            <a:schemeClr val="accent1"/>
+          </a:lnRef>
+          <a:fillRef idx="0">
+            <a:schemeClr val="accent1"/>
+          </a:fillRef>
+          <a:effectRef idx="0">
+            <a:schemeClr val="accent1"/>
+          </a:effectRef>
+          <a:fontRef idx="minor">
+            <a:schemeClr val="tx1"/>
+          </a:fontRef>
+        </p:style>
+      </p:cxnSp>
+      <p:cxnSp>
+        <p:nvCxnSpPr>
+          <p:cNvPr id="85" name="מחבר ישר 84">
+            <a:extLst>
+              <a:ext uri="{FF2B5EF4-FFF2-40B4-BE49-F238E27FC236}">
+                <a16:creationId xmlns:a16="http://schemas.microsoft.com/office/drawing/2014/main" id="{FF1C401F-6BEC-405C-8AA5-48AF1CC383F2}"/>
+              </a:ext>
+            </a:extLst>
+          </p:cNvPr>
+          <p:cNvCxnSpPr>
+            <a:cxnSpLocks/>
+          </p:cNvCxnSpPr>
+          <p:nvPr/>
+        </p:nvCxnSpPr>
+        <p:spPr>
+          <a:xfrm flipH="1" flipV="1">
+            <a:off x="10470758" y="2790070"/>
+            <a:ext cx="1159116" cy="874654"/>
+          </a:xfrm>
+          <a:prstGeom prst="line">
+            <a:avLst/>
+          </a:prstGeom>
+          <a:ln w="9525" cap="flat" cmpd="sng" algn="ctr">
+            <a:solidFill>
+              <a:schemeClr val="accent1"/>
+            </a:solidFill>
+            <a:prstDash val="solid"/>
+            <a:round/>
+            <a:headEnd type="none" w="med" len="med"/>
+            <a:tailEnd type="arrow" w="med" len="med"/>
+          </a:ln>
+        </p:spPr>
+        <p:style>
+          <a:lnRef idx="0">
+            <a:scrgbClr r="0" g="0" b="0"/>
+          </a:lnRef>
+          <a:fillRef idx="0">
+            <a:scrgbClr r="0" g="0" b="0"/>
+          </a:fillRef>
+          <a:effectRef idx="0">
+            <a:scrgbClr r="0" g="0" b="0"/>
+          </a:effectRef>
+          <a:fontRef idx="minor">
+            <a:schemeClr val="tx1"/>
+          </a:fontRef>
+        </p:style>
+      </p:cxnSp>
+      <p:cxnSp>
+        <p:nvCxnSpPr>
+          <p:cNvPr id="89" name="מחבר חץ ישר 88">
+            <a:extLst>
+              <a:ext uri="{FF2B5EF4-FFF2-40B4-BE49-F238E27FC236}">
+                <a16:creationId xmlns:a16="http://schemas.microsoft.com/office/drawing/2014/main" id="{D2BE99B7-4AA5-430F-B478-7661D76C6C20}"/>
+              </a:ext>
+            </a:extLst>
+          </p:cNvPr>
+          <p:cNvCxnSpPr>
+            <a:cxnSpLocks/>
+            <a:endCxn id="74" idx="6"/>
+          </p:cNvCxnSpPr>
+          <p:nvPr/>
+        </p:nvCxnSpPr>
+        <p:spPr>
+          <a:xfrm flipH="1" flipV="1">
+            <a:off x="10310617" y="5069777"/>
+            <a:ext cx="817217" cy="654294"/>
+          </a:xfrm>
+          <a:prstGeom prst="straightConnector1">
+            <a:avLst/>
+          </a:prstGeom>
+          <a:ln>
+            <a:tailEnd type="triangle"/>
+          </a:ln>
+        </p:spPr>
+        <p:style>
+          <a:lnRef idx="1">
+            <a:schemeClr val="accent1"/>
+          </a:lnRef>
+          <a:fillRef idx="0">
+            <a:schemeClr val="accent1"/>
+          </a:fillRef>
+          <a:effectRef idx="0">
+            <a:schemeClr val="accent1"/>
+          </a:effectRef>
+          <a:fontRef idx="minor">
+            <a:schemeClr val="tx1"/>
+          </a:fontRef>
+        </p:style>
+      </p:cxnSp>
+      <p:cxnSp>
+        <p:nvCxnSpPr>
+          <p:cNvPr id="91" name="מחבר חץ ישר 90">
+            <a:extLst>
+              <a:ext uri="{FF2B5EF4-FFF2-40B4-BE49-F238E27FC236}">
+                <a16:creationId xmlns:a16="http://schemas.microsoft.com/office/drawing/2014/main" id="{E705F483-1055-4589-A50A-0E247DDC7213}"/>
+              </a:ext>
+            </a:extLst>
+          </p:cNvPr>
+          <p:cNvCxnSpPr>
+            <a:endCxn id="78" idx="6"/>
+          </p:cNvCxnSpPr>
+          <p:nvPr/>
+        </p:nvCxnSpPr>
+        <p:spPr>
+          <a:xfrm flipH="1" flipV="1">
+            <a:off x="10376228" y="5646716"/>
+            <a:ext cx="709250" cy="70582"/>
+          </a:xfrm>
+          <a:prstGeom prst="straightConnector1">
+            <a:avLst/>
+          </a:prstGeom>
+          <a:ln>
+            <a:tailEnd type="triangle"/>
+          </a:ln>
+        </p:spPr>
+        <p:style>
+          <a:lnRef idx="1">
+            <a:schemeClr val="accent1"/>
+          </a:lnRef>
+          <a:fillRef idx="0">
+            <a:schemeClr val="accent1"/>
+          </a:fillRef>
+          <a:effectRef idx="0">
+            <a:schemeClr val="accent1"/>
+          </a:effectRef>
+          <a:fontRef idx="minor">
+            <a:schemeClr val="tx1"/>
+          </a:fontRef>
+        </p:style>
+      </p:cxnSp>
+      <p:cxnSp>
+        <p:nvCxnSpPr>
+          <p:cNvPr id="93" name="מחבר חץ ישר 92">
+            <a:extLst>
+              <a:ext uri="{FF2B5EF4-FFF2-40B4-BE49-F238E27FC236}">
+                <a16:creationId xmlns:a16="http://schemas.microsoft.com/office/drawing/2014/main" id="{FA880C07-D1CA-4F56-8F5A-63F69A8F03DB}"/>
+              </a:ext>
+            </a:extLst>
+          </p:cNvPr>
+          <p:cNvCxnSpPr>
+            <a:cxnSpLocks/>
+            <a:endCxn id="75" idx="6"/>
+          </p:cNvCxnSpPr>
+          <p:nvPr/>
+        </p:nvCxnSpPr>
+        <p:spPr>
+          <a:xfrm flipH="1">
+            <a:off x="10376228" y="5764421"/>
+            <a:ext cx="782798" cy="419497"/>
+          </a:xfrm>
+          <a:prstGeom prst="straightConnector1">
+            <a:avLst/>
+          </a:prstGeom>
+          <a:ln>
+            <a:tailEnd type="triangle"/>
+          </a:ln>
+        </p:spPr>
+        <p:style>
+          <a:lnRef idx="1">
+            <a:schemeClr val="accent1"/>
+          </a:lnRef>
+          <a:fillRef idx="0">
+            <a:schemeClr val="accent1"/>
+          </a:fillRef>
+          <a:effectRef idx="0">
+            <a:schemeClr val="accent1"/>
+          </a:effectRef>
+          <a:fontRef idx="minor">
+            <a:schemeClr val="tx1"/>
+          </a:fontRef>
+        </p:style>
+      </p:cxnSp>
+      <p:cxnSp>
+        <p:nvCxnSpPr>
+          <p:cNvPr id="97" name="מחבר ישר 96">
+            <a:extLst>
+              <a:ext uri="{FF2B5EF4-FFF2-40B4-BE49-F238E27FC236}">
+                <a16:creationId xmlns:a16="http://schemas.microsoft.com/office/drawing/2014/main" id="{E19B8D57-F10A-464D-8146-DBC52A6DB4FC}"/>
+              </a:ext>
+            </a:extLst>
+          </p:cNvPr>
+          <p:cNvCxnSpPr>
+            <a:cxnSpLocks/>
+          </p:cNvCxnSpPr>
+          <p:nvPr/>
+        </p:nvCxnSpPr>
+        <p:spPr>
+          <a:xfrm flipH="1">
+            <a:off x="10546720" y="3656965"/>
+            <a:ext cx="1083155" cy="247180"/>
+          </a:xfrm>
+          <a:prstGeom prst="line">
+            <a:avLst/>
+          </a:prstGeom>
+          <a:ln w="9525" cap="flat" cmpd="sng" algn="ctr">
+            <a:solidFill>
+              <a:schemeClr val="accent5"/>
+            </a:solidFill>
+            <a:prstDash val="solid"/>
+            <a:round/>
+            <a:headEnd type="none" w="med" len="med"/>
+            <a:tailEnd type="arrow" w="med" len="med"/>
+          </a:ln>
+        </p:spPr>
+        <p:style>
+          <a:lnRef idx="0">
+            <a:scrgbClr r="0" g="0" b="0"/>
+          </a:lnRef>
+          <a:fillRef idx="0">
+            <a:scrgbClr r="0" g="0" b="0"/>
+          </a:fillRef>
+          <a:effectRef idx="0">
+            <a:scrgbClr r="0" g="0" b="0"/>
+          </a:effectRef>
+          <a:fontRef idx="minor">
+            <a:schemeClr val="tx1"/>
+          </a:fontRef>
+        </p:style>
+      </p:cxnSp>
+      <p:cxnSp>
+        <p:nvCxnSpPr>
+          <p:cNvPr id="102" name="מחבר ישר 101">
+            <a:extLst>
+              <a:ext uri="{FF2B5EF4-FFF2-40B4-BE49-F238E27FC236}">
+                <a16:creationId xmlns:a16="http://schemas.microsoft.com/office/drawing/2014/main" id="{ECB634CC-2486-4CE5-9D9B-69897CF3364F}"/>
+              </a:ext>
+            </a:extLst>
+          </p:cNvPr>
+          <p:cNvCxnSpPr>
+            <a:cxnSpLocks/>
+            <a:endCxn id="71" idx="6"/>
+          </p:cNvCxnSpPr>
+          <p:nvPr/>
+        </p:nvCxnSpPr>
+        <p:spPr>
+          <a:xfrm flipH="1">
+            <a:off x="10352657" y="1869231"/>
+            <a:ext cx="1082259" cy="78480"/>
+          </a:xfrm>
+          <a:prstGeom prst="line">
+            <a:avLst/>
+          </a:prstGeom>
+        </p:spPr>
+        <p:style>
+          <a:lnRef idx="1">
+            <a:schemeClr val="accent1"/>
+          </a:lnRef>
+          <a:fillRef idx="0">
+            <a:schemeClr val="accent1"/>
+          </a:fillRef>
+          <a:effectRef idx="0">
+            <a:schemeClr val="accent1"/>
+          </a:effectRef>
+          <a:fontRef idx="minor">
+            <a:schemeClr val="tx1"/>
+          </a:fontRef>
+        </p:style>
+      </p:cxnSp>
+      <p:cxnSp>
+        <p:nvCxnSpPr>
+          <p:cNvPr id="111" name="מחבר ישר 110">
+            <a:extLst>
+              <a:ext uri="{FF2B5EF4-FFF2-40B4-BE49-F238E27FC236}">
+                <a16:creationId xmlns:a16="http://schemas.microsoft.com/office/drawing/2014/main" id="{431CE17B-0177-4044-BB6B-1BB530311F17}"/>
+              </a:ext>
+            </a:extLst>
+          </p:cNvPr>
+          <p:cNvCxnSpPr>
+            <a:cxnSpLocks/>
+          </p:cNvCxnSpPr>
+          <p:nvPr/>
+        </p:nvCxnSpPr>
+        <p:spPr>
+          <a:xfrm flipH="1">
+            <a:off x="10504704" y="3670803"/>
+            <a:ext cx="1118058" cy="806657"/>
+          </a:xfrm>
+          <a:prstGeom prst="line">
+            <a:avLst/>
+          </a:prstGeom>
+          <a:ln w="9525" cap="flat" cmpd="sng" algn="ctr">
+            <a:solidFill>
+              <a:schemeClr val="accent5"/>
+            </a:solidFill>
+            <a:prstDash val="solid"/>
+            <a:round/>
+            <a:headEnd type="none" w="med" len="med"/>
+            <a:tailEnd type="arrow" w="med" len="med"/>
+          </a:ln>
+        </p:spPr>
+        <p:style>
+          <a:lnRef idx="0">
+            <a:scrgbClr r="0" g="0" b="0"/>
+          </a:lnRef>
+          <a:fillRef idx="0">
+            <a:scrgbClr r="0" g="0" b="0"/>
+          </a:fillRef>
+          <a:effectRef idx="0">
+            <a:scrgbClr r="0" g="0" b="0"/>
+          </a:effectRef>
+          <a:fontRef idx="minor">
+            <a:schemeClr val="tx1"/>
+          </a:fontRef>
+        </p:style>
+      </p:cxnSp>
+      <p:cxnSp>
+        <p:nvCxnSpPr>
+          <p:cNvPr id="114" name="מחבר ישר 113">
+            <a:extLst>
+              <a:ext uri="{FF2B5EF4-FFF2-40B4-BE49-F238E27FC236}">
+                <a16:creationId xmlns:a16="http://schemas.microsoft.com/office/drawing/2014/main" id="{2B14EE58-E95B-4EE7-A346-6EF9AC8219DE}"/>
+              </a:ext>
+            </a:extLst>
+          </p:cNvPr>
+          <p:cNvCxnSpPr>
+            <a:cxnSpLocks/>
+          </p:cNvCxnSpPr>
+          <p:nvPr/>
+        </p:nvCxnSpPr>
+        <p:spPr>
+          <a:xfrm flipH="1" flipV="1">
+            <a:off x="10466178" y="4585563"/>
+            <a:ext cx="645762" cy="1131387"/>
+          </a:xfrm>
+          <a:prstGeom prst="line">
+            <a:avLst/>
+          </a:prstGeom>
+          <a:ln w="9525" cap="flat" cmpd="sng" algn="ctr">
+            <a:solidFill>
+              <a:schemeClr val="accent5"/>
+            </a:solidFill>
+            <a:prstDash val="solid"/>
+            <a:round/>
+            <a:headEnd type="none" w="med" len="med"/>
+            <a:tailEnd type="arrow" w="med" len="med"/>
+          </a:ln>
+        </p:spPr>
+        <p:style>
+          <a:lnRef idx="0">
+            <a:scrgbClr r="0" g="0" b="0"/>
+          </a:lnRef>
+          <a:fillRef idx="0">
+            <a:scrgbClr r="0" g="0" b="0"/>
+          </a:fillRef>
+          <a:effectRef idx="0">
+            <a:scrgbClr r="0" g="0" b="0"/>
+          </a:effectRef>
+          <a:fontRef idx="minor">
+            <a:schemeClr val="tx1"/>
+          </a:fontRef>
+        </p:style>
+      </p:cxnSp>
+      <p:cxnSp>
+        <p:nvCxnSpPr>
+          <p:cNvPr id="125" name="מחבר ישר 124">
+            <a:extLst>
+              <a:ext uri="{FF2B5EF4-FFF2-40B4-BE49-F238E27FC236}">
+                <a16:creationId xmlns:a16="http://schemas.microsoft.com/office/drawing/2014/main" id="{01457FC8-66FD-4515-A148-4A5A3286E0A8}"/>
+              </a:ext>
+            </a:extLst>
+          </p:cNvPr>
+          <p:cNvCxnSpPr/>
+          <p:nvPr/>
+        </p:nvCxnSpPr>
+        <p:spPr>
+          <a:xfrm flipH="1">
+            <a:off x="10504704" y="5830401"/>
+            <a:ext cx="654322" cy="946576"/>
+          </a:xfrm>
+          <a:prstGeom prst="line">
+            <a:avLst/>
+          </a:prstGeom>
+        </p:spPr>
+        <p:style>
+          <a:lnRef idx="1">
+            <a:schemeClr val="accent1"/>
+          </a:lnRef>
+          <a:fillRef idx="0">
+            <a:schemeClr val="accent1"/>
+          </a:fillRef>
+          <a:effectRef idx="0">
+            <a:schemeClr val="accent1"/>
+          </a:effectRef>
+          <a:fontRef idx="minor">
+            <a:schemeClr val="tx1"/>
+          </a:fontRef>
+        </p:style>
+      </p:cxnSp>
+      <p:cxnSp>
+        <p:nvCxnSpPr>
+          <p:cNvPr id="129" name="מחבר ישר 128">
+            <a:extLst>
+              <a:ext uri="{FF2B5EF4-FFF2-40B4-BE49-F238E27FC236}">
+                <a16:creationId xmlns:a16="http://schemas.microsoft.com/office/drawing/2014/main" id="{8743A0C3-2E8A-4CBD-85B0-4957CB291E95}"/>
+              </a:ext>
+            </a:extLst>
+          </p:cNvPr>
+          <p:cNvCxnSpPr/>
+          <p:nvPr/>
+        </p:nvCxnSpPr>
+        <p:spPr>
+          <a:xfrm flipH="1" flipV="1">
+            <a:off x="7882357" y="6742255"/>
+            <a:ext cx="2630117" cy="40512"/>
+          </a:xfrm>
+          <a:prstGeom prst="line">
+            <a:avLst/>
+          </a:prstGeom>
+        </p:spPr>
+        <p:style>
+          <a:lnRef idx="1">
+            <a:schemeClr val="accent1"/>
+          </a:lnRef>
+          <a:fillRef idx="0">
+            <a:schemeClr val="accent1"/>
+          </a:fillRef>
+          <a:effectRef idx="0">
+            <a:schemeClr val="accent1"/>
+          </a:effectRef>
+          <a:fontRef idx="minor">
+            <a:schemeClr val="tx1"/>
+          </a:fontRef>
+        </p:style>
+      </p:cxnSp>
+      <p:cxnSp>
+        <p:nvCxnSpPr>
+          <p:cNvPr id="131" name="מחבר: מרפקי 130">
+            <a:extLst>
+              <a:ext uri="{FF2B5EF4-FFF2-40B4-BE49-F238E27FC236}">
+                <a16:creationId xmlns:a16="http://schemas.microsoft.com/office/drawing/2014/main" id="{08F033E5-8661-4FE2-AB11-373A3B4E7529}"/>
+              </a:ext>
+            </a:extLst>
+          </p:cNvPr>
+          <p:cNvCxnSpPr>
+            <a:cxnSpLocks/>
+            <a:endCxn id="76" idx="2"/>
+          </p:cNvCxnSpPr>
+          <p:nvPr/>
+        </p:nvCxnSpPr>
+        <p:spPr>
+          <a:xfrm rot="5400000" flipH="1" flipV="1">
+            <a:off x="6238241" y="4412645"/>
+            <a:ext cx="3973730" cy="698197"/>
+          </a:xfrm>
+          <a:prstGeom prst="bentConnector2">
+            <a:avLst/>
+          </a:prstGeom>
+          <a:ln>
+            <a:tailEnd type="triangle"/>
+          </a:ln>
+        </p:spPr>
+        <p:style>
+          <a:lnRef idx="1">
+            <a:schemeClr val="accent1"/>
+          </a:lnRef>
+          <a:fillRef idx="0">
+            <a:schemeClr val="accent1"/>
+          </a:fillRef>
+          <a:effectRef idx="0">
+            <a:schemeClr val="accent1"/>
+          </a:effectRef>
+          <a:fontRef idx="minor">
+            <a:schemeClr val="tx1"/>
+          </a:fontRef>
+        </p:style>
+      </p:cxnSp>
     </p:spTree>
     <p:extLst>
       <p:ext uri="{BB962C8B-B14F-4D97-AF65-F5344CB8AC3E}">

</xml_diff>

<commit_message>
small changes before submission
</commit_message>
<xml_diff>
--- a/use cases/use_case_diagram_system.pptx
+++ b/use cases/use_case_diagram_system.pptx
@@ -5,9 +5,7 @@
     <p:sldMasterId id="2147483648" r:id="rId1"/>
   </p:sldMasterIdLst>
   <p:sldIdLst>
-    <p:sldId id="257" r:id="rId2"/>
-    <p:sldId id="256" r:id="rId3"/>
-    <p:sldId id="259" r:id="rId4"/>
+    <p:sldId id="259" r:id="rId2"/>
   </p:sldIdLst>
   <p:sldSz cx="12192000" cy="6858000"/>
   <p:notesSz cx="6858000" cy="9144000"/>
@@ -261,7 +259,7 @@
           <a:p>
             <a:fld id="{808C3DBF-4E85-4432-AFC9-4C85C7D0F8E2}" type="datetimeFigureOut">
               <a:rPr lang="en-US" smtClean="0"/>
-              <a:t>4/19/2018</a:t>
+              <a:t>4/22/18</a:t>
             </a:fld>
             <a:endParaRPr lang="en-US"/>
           </a:p>
@@ -459,7 +457,7 @@
           <a:p>
             <a:fld id="{808C3DBF-4E85-4432-AFC9-4C85C7D0F8E2}" type="datetimeFigureOut">
               <a:rPr lang="en-US" smtClean="0"/>
-              <a:t>4/19/2018</a:t>
+              <a:t>4/22/18</a:t>
             </a:fld>
             <a:endParaRPr lang="en-US"/>
           </a:p>
@@ -667,7 +665,7 @@
           <a:p>
             <a:fld id="{808C3DBF-4E85-4432-AFC9-4C85C7D0F8E2}" type="datetimeFigureOut">
               <a:rPr lang="en-US" smtClean="0"/>
-              <a:t>4/19/2018</a:t>
+              <a:t>4/22/18</a:t>
             </a:fld>
             <a:endParaRPr lang="en-US"/>
           </a:p>
@@ -865,7 +863,7 @@
           <a:p>
             <a:fld id="{808C3DBF-4E85-4432-AFC9-4C85C7D0F8E2}" type="datetimeFigureOut">
               <a:rPr lang="en-US" smtClean="0"/>
-              <a:t>4/19/2018</a:t>
+              <a:t>4/22/18</a:t>
             </a:fld>
             <a:endParaRPr lang="en-US"/>
           </a:p>
@@ -1140,7 +1138,7 @@
           <a:p>
             <a:fld id="{808C3DBF-4E85-4432-AFC9-4C85C7D0F8E2}" type="datetimeFigureOut">
               <a:rPr lang="en-US" smtClean="0"/>
-              <a:t>4/19/2018</a:t>
+              <a:t>4/22/18</a:t>
             </a:fld>
             <a:endParaRPr lang="en-US"/>
           </a:p>
@@ -1405,7 +1403,7 @@
           <a:p>
             <a:fld id="{808C3DBF-4E85-4432-AFC9-4C85C7D0F8E2}" type="datetimeFigureOut">
               <a:rPr lang="en-US" smtClean="0"/>
-              <a:t>4/19/2018</a:t>
+              <a:t>4/22/18</a:t>
             </a:fld>
             <a:endParaRPr lang="en-US"/>
           </a:p>
@@ -1817,7 +1815,7 @@
           <a:p>
             <a:fld id="{808C3DBF-4E85-4432-AFC9-4C85C7D0F8E2}" type="datetimeFigureOut">
               <a:rPr lang="en-US" smtClean="0"/>
-              <a:t>4/19/2018</a:t>
+              <a:t>4/22/18</a:t>
             </a:fld>
             <a:endParaRPr lang="en-US"/>
           </a:p>
@@ -1958,7 +1956,7 @@
           <a:p>
             <a:fld id="{808C3DBF-4E85-4432-AFC9-4C85C7D0F8E2}" type="datetimeFigureOut">
               <a:rPr lang="en-US" smtClean="0"/>
-              <a:t>4/19/2018</a:t>
+              <a:t>4/22/18</a:t>
             </a:fld>
             <a:endParaRPr lang="en-US"/>
           </a:p>
@@ -2071,7 +2069,7 @@
           <a:p>
             <a:fld id="{808C3DBF-4E85-4432-AFC9-4C85C7D0F8E2}" type="datetimeFigureOut">
               <a:rPr lang="en-US" smtClean="0"/>
-              <a:t>4/19/2018</a:t>
+              <a:t>4/22/18</a:t>
             </a:fld>
             <a:endParaRPr lang="en-US"/>
           </a:p>
@@ -2382,7 +2380,7 @@
           <a:p>
             <a:fld id="{808C3DBF-4E85-4432-AFC9-4C85C7D0F8E2}" type="datetimeFigureOut">
               <a:rPr lang="en-US" smtClean="0"/>
-              <a:t>4/19/2018</a:t>
+              <a:t>4/22/18</a:t>
             </a:fld>
             <a:endParaRPr lang="en-US"/>
           </a:p>
@@ -2670,7 +2668,7 @@
           <a:p>
             <a:fld id="{808C3DBF-4E85-4432-AFC9-4C85C7D0F8E2}" type="datetimeFigureOut">
               <a:rPr lang="en-US" smtClean="0"/>
-              <a:t>4/19/2018</a:t>
+              <a:t>4/22/18</a:t>
             </a:fld>
             <a:endParaRPr lang="en-US"/>
           </a:p>
@@ -2911,7 +2909,7 @@
           <a:p>
             <a:fld id="{808C3DBF-4E85-4432-AFC9-4C85C7D0F8E2}" type="datetimeFigureOut">
               <a:rPr lang="en-US" smtClean="0"/>
-              <a:t>4/19/2018</a:t>
+              <a:t>4/22/18</a:t>
             </a:fld>
             <a:endParaRPr lang="en-US"/>
           </a:p>
@@ -3312,2895 +3310,6 @@
 </file>
 
 <file path=ppt/slides/slide1.xml><?xml version="1.0" encoding="utf-8"?>
-<p:sld xmlns:a="http://schemas.openxmlformats.org/drawingml/2006/main" xmlns:r="http://schemas.openxmlformats.org/officeDocument/2006/relationships" xmlns:p="http://schemas.openxmlformats.org/presentationml/2006/main">
-  <p:cSld>
-    <p:spTree>
-      <p:nvGrpSpPr>
-        <p:cNvPr id="1" name=""/>
-        <p:cNvGrpSpPr/>
-        <p:nvPr/>
-      </p:nvGrpSpPr>
-      <p:grpSpPr>
-        <a:xfrm>
-          <a:off x="0" y="0"/>
-          <a:ext cx="0" cy="0"/>
-          <a:chOff x="0" y="0"/>
-          <a:chExt cx="0" cy="0"/>
-        </a:xfrm>
-      </p:grpSpPr>
-      <p:sp>
-        <p:nvSpPr>
-          <p:cNvPr id="75" name="Rectangle: Rounded Corners 74">
-            <a:extLst>
-              <a:ext uri="{FF2B5EF4-FFF2-40B4-BE49-F238E27FC236}">
-                <a16:creationId xmlns:a16="http://schemas.microsoft.com/office/drawing/2014/main" id="{0CA1D288-C0A8-44FE-8FEA-38AE183BD19D}"/>
-              </a:ext>
-            </a:extLst>
-          </p:cNvPr>
-          <p:cNvSpPr/>
-          <p:nvPr/>
-        </p:nvSpPr>
-        <p:spPr>
-          <a:xfrm>
-            <a:off x="7528543" y="542457"/>
-            <a:ext cx="1212219" cy="475623"/>
-          </a:xfrm>
-          <a:prstGeom prst="roundRect">
-            <a:avLst/>
-          </a:prstGeom>
-          <a:solidFill>
-            <a:schemeClr val="bg1"/>
-          </a:solidFill>
-        </p:spPr>
-        <p:style>
-          <a:lnRef idx="2">
-            <a:schemeClr val="accent1">
-              <a:shade val="50000"/>
-            </a:schemeClr>
-          </a:lnRef>
-          <a:fillRef idx="1">
-            <a:schemeClr val="accent1"/>
-          </a:fillRef>
-          <a:effectRef idx="0">
-            <a:schemeClr val="accent1"/>
-          </a:effectRef>
-          <a:fontRef idx="minor">
-            <a:schemeClr val="lt1"/>
-          </a:fontRef>
-        </p:style>
-        <p:txBody>
-          <a:bodyPr rtlCol="0" anchor="ctr"/>
-          <a:lstStyle/>
-          <a:p>
-            <a:pPr algn="ctr"/>
-            <a:r>
-              <a:rPr lang="he-IL" dirty="0">
-                <a:solidFill>
-                  <a:schemeClr val="tx1"/>
-                </a:solidFill>
-              </a:rPr>
-              <a:t>חניונים</a:t>
-            </a:r>
-          </a:p>
-        </p:txBody>
-      </p:sp>
-      <p:sp>
-        <p:nvSpPr>
-          <p:cNvPr id="74" name="Rectangle: Rounded Corners 73">
-            <a:extLst>
-              <a:ext uri="{FF2B5EF4-FFF2-40B4-BE49-F238E27FC236}">
-                <a16:creationId xmlns:a16="http://schemas.microsoft.com/office/drawing/2014/main" id="{4F7EEAA5-BB86-4BF9-AA43-32CC07E2ABF9}"/>
-              </a:ext>
-            </a:extLst>
-          </p:cNvPr>
-          <p:cNvSpPr/>
-          <p:nvPr/>
-        </p:nvSpPr>
-        <p:spPr>
-          <a:xfrm>
-            <a:off x="7436792" y="616669"/>
-            <a:ext cx="1212219" cy="475623"/>
-          </a:xfrm>
-          <a:prstGeom prst="roundRect">
-            <a:avLst/>
-          </a:prstGeom>
-          <a:solidFill>
-            <a:schemeClr val="bg1"/>
-          </a:solidFill>
-        </p:spPr>
-        <p:style>
-          <a:lnRef idx="2">
-            <a:schemeClr val="accent1">
-              <a:shade val="50000"/>
-            </a:schemeClr>
-          </a:lnRef>
-          <a:fillRef idx="1">
-            <a:schemeClr val="accent1"/>
-          </a:fillRef>
-          <a:effectRef idx="0">
-            <a:schemeClr val="accent1"/>
-          </a:effectRef>
-          <a:fontRef idx="minor">
-            <a:schemeClr val="lt1"/>
-          </a:fontRef>
-        </p:style>
-        <p:txBody>
-          <a:bodyPr rtlCol="0" anchor="ctr"/>
-          <a:lstStyle/>
-          <a:p>
-            <a:pPr algn="ctr"/>
-            <a:r>
-              <a:rPr lang="he-IL" dirty="0">
-                <a:solidFill>
-                  <a:schemeClr val="tx1"/>
-                </a:solidFill>
-              </a:rPr>
-              <a:t>חניונים</a:t>
-            </a:r>
-          </a:p>
-        </p:txBody>
-      </p:sp>
-      <p:sp>
-        <p:nvSpPr>
-          <p:cNvPr id="4" name="Rectangle 3">
-            <a:extLst>
-              <a:ext uri="{FF2B5EF4-FFF2-40B4-BE49-F238E27FC236}">
-                <a16:creationId xmlns:a16="http://schemas.microsoft.com/office/drawing/2014/main" id="{1322D5D0-A732-4E4B-A1A4-7582648FAD8B}"/>
-              </a:ext>
-            </a:extLst>
-          </p:cNvPr>
-          <p:cNvSpPr/>
-          <p:nvPr/>
-        </p:nvSpPr>
-        <p:spPr>
-          <a:xfrm>
-            <a:off x="4795520" y="538480"/>
-            <a:ext cx="1859280" cy="1256047"/>
-          </a:xfrm>
-          <a:prstGeom prst="rect">
-            <a:avLst/>
-          </a:prstGeom>
-          <a:noFill/>
-        </p:spPr>
-        <p:style>
-          <a:lnRef idx="2">
-            <a:schemeClr val="accent1">
-              <a:shade val="50000"/>
-            </a:schemeClr>
-          </a:lnRef>
-          <a:fillRef idx="1">
-            <a:schemeClr val="accent1"/>
-          </a:fillRef>
-          <a:effectRef idx="0">
-            <a:schemeClr val="accent1"/>
-          </a:effectRef>
-          <a:fontRef idx="minor">
-            <a:schemeClr val="lt1"/>
-          </a:fontRef>
-        </p:style>
-        <p:txBody>
-          <a:bodyPr rtlCol="0" anchor="ctr"/>
-          <a:lstStyle/>
-          <a:p>
-            <a:pPr algn="ctr"/>
-            <a:r>
-              <a:rPr lang="he-IL" dirty="0">
-                <a:solidFill>
-                  <a:schemeClr val="tx1"/>
-                </a:solidFill>
-              </a:rPr>
-              <a:t>חניה בעיר</a:t>
-            </a:r>
-            <a:endParaRPr lang="en-US" dirty="0">
-              <a:solidFill>
-                <a:schemeClr val="tx1"/>
-              </a:solidFill>
-            </a:endParaRPr>
-          </a:p>
-        </p:txBody>
-      </p:sp>
-      <p:sp>
-        <p:nvSpPr>
-          <p:cNvPr id="5" name="Rectangle 4">
-            <a:extLst>
-              <a:ext uri="{FF2B5EF4-FFF2-40B4-BE49-F238E27FC236}">
-                <a16:creationId xmlns:a16="http://schemas.microsoft.com/office/drawing/2014/main" id="{8B7058C9-6978-40DF-9E84-832BF184F06A}"/>
-              </a:ext>
-            </a:extLst>
-          </p:cNvPr>
-          <p:cNvSpPr/>
-          <p:nvPr/>
-        </p:nvSpPr>
-        <p:spPr>
-          <a:xfrm>
-            <a:off x="3276600" y="2702560"/>
-            <a:ext cx="4897120" cy="3688080"/>
-          </a:xfrm>
-          <a:prstGeom prst="rect">
-            <a:avLst/>
-          </a:prstGeom>
-          <a:noFill/>
-        </p:spPr>
-        <p:style>
-          <a:lnRef idx="2">
-            <a:schemeClr val="accent1">
-              <a:shade val="50000"/>
-            </a:schemeClr>
-          </a:lnRef>
-          <a:fillRef idx="1">
-            <a:schemeClr val="accent1"/>
-          </a:fillRef>
-          <a:effectRef idx="0">
-            <a:schemeClr val="accent1"/>
-          </a:effectRef>
-          <a:fontRef idx="minor">
-            <a:schemeClr val="lt1"/>
-          </a:fontRef>
-        </p:style>
-        <p:txBody>
-          <a:bodyPr rtlCol="0" anchor="ctr"/>
-          <a:lstStyle/>
-          <a:p>
-            <a:pPr algn="ctr"/>
-            <a:endParaRPr lang="en-US" dirty="0">
-              <a:solidFill>
-                <a:schemeClr val="tx1"/>
-              </a:solidFill>
-            </a:endParaRPr>
-          </a:p>
-        </p:txBody>
-      </p:sp>
-      <p:sp>
-        <p:nvSpPr>
-          <p:cNvPr id="9" name="Rectangle: Rounded Corners 8">
-            <a:extLst>
-              <a:ext uri="{FF2B5EF4-FFF2-40B4-BE49-F238E27FC236}">
-                <a16:creationId xmlns:a16="http://schemas.microsoft.com/office/drawing/2014/main" id="{017879C7-B5FD-49F0-BBF8-A20D2B076983}"/>
-              </a:ext>
-            </a:extLst>
-          </p:cNvPr>
-          <p:cNvSpPr/>
-          <p:nvPr/>
-        </p:nvSpPr>
-        <p:spPr>
-          <a:xfrm>
-            <a:off x="7352661" y="690880"/>
-            <a:ext cx="1212219" cy="475623"/>
-          </a:xfrm>
-          <a:prstGeom prst="roundRect">
-            <a:avLst/>
-          </a:prstGeom>
-          <a:solidFill>
-            <a:schemeClr val="bg1"/>
-          </a:solidFill>
-        </p:spPr>
-        <p:style>
-          <a:lnRef idx="2">
-            <a:schemeClr val="accent1">
-              <a:shade val="50000"/>
-            </a:schemeClr>
-          </a:lnRef>
-          <a:fillRef idx="1">
-            <a:schemeClr val="accent1"/>
-          </a:fillRef>
-          <a:effectRef idx="0">
-            <a:schemeClr val="accent1"/>
-          </a:effectRef>
-          <a:fontRef idx="minor">
-            <a:schemeClr val="lt1"/>
-          </a:fontRef>
-        </p:style>
-        <p:txBody>
-          <a:bodyPr rtlCol="0" anchor="ctr"/>
-          <a:lstStyle/>
-          <a:p>
-            <a:pPr algn="ctr"/>
-            <a:r>
-              <a:rPr lang="he-IL" dirty="0">
-                <a:solidFill>
-                  <a:schemeClr val="tx1"/>
-                </a:solidFill>
-              </a:rPr>
-              <a:t>חניונים</a:t>
-            </a:r>
-          </a:p>
-        </p:txBody>
-      </p:sp>
-      <p:sp>
-        <p:nvSpPr>
-          <p:cNvPr id="10" name="Rectangle: Rounded Corners 9">
-            <a:extLst>
-              <a:ext uri="{FF2B5EF4-FFF2-40B4-BE49-F238E27FC236}">
-                <a16:creationId xmlns:a16="http://schemas.microsoft.com/office/drawing/2014/main" id="{1D30CD7D-6707-4BFD-B1D5-D6804C2E8D3E}"/>
-              </a:ext>
-            </a:extLst>
-          </p:cNvPr>
-          <p:cNvSpPr/>
-          <p:nvPr/>
-        </p:nvSpPr>
-        <p:spPr>
-          <a:xfrm>
-            <a:off x="4673600" y="3180914"/>
-            <a:ext cx="1212219" cy="737438"/>
-          </a:xfrm>
-          <a:prstGeom prst="roundRect">
-            <a:avLst/>
-          </a:prstGeom>
-          <a:noFill/>
-        </p:spPr>
-        <p:style>
-          <a:lnRef idx="2">
-            <a:schemeClr val="accent1">
-              <a:shade val="50000"/>
-            </a:schemeClr>
-          </a:lnRef>
-          <a:fillRef idx="1">
-            <a:schemeClr val="accent1"/>
-          </a:fillRef>
-          <a:effectRef idx="0">
-            <a:schemeClr val="accent1"/>
-          </a:effectRef>
-          <a:fontRef idx="minor">
-            <a:schemeClr val="lt1"/>
-          </a:fontRef>
-        </p:style>
-        <p:txBody>
-          <a:bodyPr rtlCol="0" anchor="ctr"/>
-          <a:lstStyle/>
-          <a:p>
-            <a:pPr algn="ctr"/>
-            <a:r>
-              <a:rPr lang="he-IL" dirty="0">
-                <a:solidFill>
-                  <a:schemeClr val="tx1"/>
-                </a:solidFill>
-              </a:rPr>
-              <a:t>מערכת </a:t>
-            </a:r>
-            <a:r>
-              <a:rPr lang="en-US" dirty="0">
-                <a:solidFill>
-                  <a:schemeClr val="tx1"/>
-                </a:solidFill>
-              </a:rPr>
-              <a:t>CPS</a:t>
-            </a:r>
-            <a:endParaRPr lang="he-IL" dirty="0">
-              <a:solidFill>
-                <a:schemeClr val="tx1"/>
-              </a:solidFill>
-            </a:endParaRPr>
-          </a:p>
-        </p:txBody>
-      </p:sp>
-      <p:sp>
-        <p:nvSpPr>
-          <p:cNvPr id="11" name="Rectangle: Rounded Corners 10">
-            <a:extLst>
-              <a:ext uri="{FF2B5EF4-FFF2-40B4-BE49-F238E27FC236}">
-                <a16:creationId xmlns:a16="http://schemas.microsoft.com/office/drawing/2014/main" id="{1F8306F2-DD6D-4DA6-ADE8-EF1E141064BC}"/>
-              </a:ext>
-            </a:extLst>
-          </p:cNvPr>
-          <p:cNvSpPr/>
-          <p:nvPr/>
-        </p:nvSpPr>
-        <p:spPr>
-          <a:xfrm>
-            <a:off x="6739759" y="3180914"/>
-            <a:ext cx="1212219" cy="737438"/>
-          </a:xfrm>
-          <a:prstGeom prst="roundRect">
-            <a:avLst/>
-          </a:prstGeom>
-          <a:noFill/>
-        </p:spPr>
-        <p:style>
-          <a:lnRef idx="2">
-            <a:schemeClr val="accent1">
-              <a:shade val="50000"/>
-            </a:schemeClr>
-          </a:lnRef>
-          <a:fillRef idx="1">
-            <a:schemeClr val="accent1"/>
-          </a:fillRef>
-          <a:effectRef idx="0">
-            <a:schemeClr val="accent1"/>
-          </a:effectRef>
-          <a:fontRef idx="minor">
-            <a:schemeClr val="lt1"/>
-          </a:fontRef>
-        </p:style>
-        <p:txBody>
-          <a:bodyPr rtlCol="0" anchor="ctr"/>
-          <a:lstStyle/>
-          <a:p>
-            <a:pPr algn="ctr"/>
-            <a:r>
-              <a:rPr lang="he-IL" dirty="0">
-                <a:solidFill>
-                  <a:schemeClr val="tx1"/>
-                </a:solidFill>
-              </a:rPr>
-              <a:t>אתר אינטרנט</a:t>
-            </a:r>
-          </a:p>
-        </p:txBody>
-      </p:sp>
-      <p:sp>
-        <p:nvSpPr>
-          <p:cNvPr id="15" name="Rectangle: Rounded Corners 14">
-            <a:extLst>
-              <a:ext uri="{FF2B5EF4-FFF2-40B4-BE49-F238E27FC236}">
-                <a16:creationId xmlns:a16="http://schemas.microsoft.com/office/drawing/2014/main" id="{19053A62-B285-448B-A506-876338916E8C}"/>
-              </a:ext>
-            </a:extLst>
-          </p:cNvPr>
-          <p:cNvSpPr/>
-          <p:nvPr/>
-        </p:nvSpPr>
-        <p:spPr>
-          <a:xfrm>
-            <a:off x="4453414" y="5126363"/>
-            <a:ext cx="1652590" cy="876356"/>
-          </a:xfrm>
-          <a:prstGeom prst="roundRect">
-            <a:avLst/>
-          </a:prstGeom>
-          <a:noFill/>
-        </p:spPr>
-        <p:style>
-          <a:lnRef idx="2">
-            <a:schemeClr val="accent1">
-              <a:shade val="50000"/>
-            </a:schemeClr>
-          </a:lnRef>
-          <a:fillRef idx="1">
-            <a:schemeClr val="accent1"/>
-          </a:fillRef>
-          <a:effectRef idx="0">
-            <a:schemeClr val="accent1"/>
-          </a:effectRef>
-          <a:fontRef idx="minor">
-            <a:schemeClr val="lt1"/>
-          </a:fontRef>
-        </p:style>
-        <p:txBody>
-          <a:bodyPr rtlCol="0" anchor="ctr"/>
-          <a:lstStyle/>
-          <a:p>
-            <a:pPr algn="ctr"/>
-            <a:r>
-              <a:rPr lang="he-IL" dirty="0">
-                <a:solidFill>
-                  <a:schemeClr val="tx1"/>
-                </a:solidFill>
-              </a:rPr>
-              <a:t>מערכת ניהול פרטי עובדות</a:t>
-            </a:r>
-          </a:p>
-        </p:txBody>
-      </p:sp>
-      <p:cxnSp>
-        <p:nvCxnSpPr>
-          <p:cNvPr id="21" name="Straight Connector 20">
-            <a:extLst>
-              <a:ext uri="{FF2B5EF4-FFF2-40B4-BE49-F238E27FC236}">
-                <a16:creationId xmlns:a16="http://schemas.microsoft.com/office/drawing/2014/main" id="{7B544733-7C60-478A-87F9-19C15751F4DA}"/>
-              </a:ext>
-            </a:extLst>
-          </p:cNvPr>
-          <p:cNvCxnSpPr>
-            <a:stCxn id="4" idx="3"/>
-            <a:endCxn id="9" idx="1"/>
-          </p:cNvCxnSpPr>
-          <p:nvPr/>
-        </p:nvCxnSpPr>
-        <p:spPr>
-          <a:xfrm flipV="1">
-            <a:off x="6654800" y="928692"/>
-            <a:ext cx="697861" cy="237812"/>
-          </a:xfrm>
-          <a:prstGeom prst="line">
-            <a:avLst/>
-          </a:prstGeom>
-        </p:spPr>
-        <p:style>
-          <a:lnRef idx="1">
-            <a:schemeClr val="accent1"/>
-          </a:lnRef>
-          <a:fillRef idx="0">
-            <a:schemeClr val="accent1"/>
-          </a:fillRef>
-          <a:effectRef idx="0">
-            <a:schemeClr val="accent1"/>
-          </a:effectRef>
-          <a:fontRef idx="minor">
-            <a:schemeClr val="tx1"/>
-          </a:fontRef>
-        </p:style>
-      </p:cxnSp>
-      <p:cxnSp>
-        <p:nvCxnSpPr>
-          <p:cNvPr id="23" name="Straight Connector 22">
-            <a:extLst>
-              <a:ext uri="{FF2B5EF4-FFF2-40B4-BE49-F238E27FC236}">
-                <a16:creationId xmlns:a16="http://schemas.microsoft.com/office/drawing/2014/main" id="{985C838E-142B-4C3B-80C9-C4CE4CCA7F23}"/>
-              </a:ext>
-            </a:extLst>
-          </p:cNvPr>
-          <p:cNvCxnSpPr>
-            <a:stCxn id="4" idx="1"/>
-          </p:cNvCxnSpPr>
-          <p:nvPr/>
-        </p:nvCxnSpPr>
-        <p:spPr>
-          <a:xfrm flipH="1" flipV="1">
-            <a:off x="4348101" y="1166503"/>
-            <a:ext cx="447419" cy="1"/>
-          </a:xfrm>
-          <a:prstGeom prst="line">
-            <a:avLst/>
-          </a:prstGeom>
-        </p:spPr>
-        <p:style>
-          <a:lnRef idx="1">
-            <a:schemeClr val="accent1"/>
-          </a:lnRef>
-          <a:fillRef idx="0">
-            <a:schemeClr val="accent1"/>
-          </a:fillRef>
-          <a:effectRef idx="0">
-            <a:schemeClr val="accent1"/>
-          </a:effectRef>
-          <a:fontRef idx="minor">
-            <a:schemeClr val="tx1"/>
-          </a:fontRef>
-        </p:style>
-      </p:cxnSp>
-      <p:cxnSp>
-        <p:nvCxnSpPr>
-          <p:cNvPr id="25" name="Straight Connector 24">
-            <a:extLst>
-              <a:ext uri="{FF2B5EF4-FFF2-40B4-BE49-F238E27FC236}">
-                <a16:creationId xmlns:a16="http://schemas.microsoft.com/office/drawing/2014/main" id="{B15FDA88-9207-4E1A-9073-1A40BE7151D5}"/>
-              </a:ext>
-            </a:extLst>
-          </p:cNvPr>
-          <p:cNvCxnSpPr>
-            <a:cxnSpLocks/>
-            <a:stCxn id="4" idx="3"/>
-          </p:cNvCxnSpPr>
-          <p:nvPr/>
-        </p:nvCxnSpPr>
-        <p:spPr>
-          <a:xfrm>
-            <a:off x="6654800" y="1166504"/>
-            <a:ext cx="893440" cy="479599"/>
-          </a:xfrm>
-          <a:prstGeom prst="line">
-            <a:avLst/>
-          </a:prstGeom>
-        </p:spPr>
-        <p:style>
-          <a:lnRef idx="1">
-            <a:schemeClr val="accent1"/>
-          </a:lnRef>
-          <a:fillRef idx="0">
-            <a:schemeClr val="accent1"/>
-          </a:fillRef>
-          <a:effectRef idx="0">
-            <a:schemeClr val="accent1"/>
-          </a:effectRef>
-          <a:fontRef idx="minor">
-            <a:schemeClr val="tx1"/>
-          </a:fontRef>
-        </p:style>
-      </p:cxnSp>
-      <p:cxnSp>
-        <p:nvCxnSpPr>
-          <p:cNvPr id="42" name="Straight Connector 41">
-            <a:extLst>
-              <a:ext uri="{FF2B5EF4-FFF2-40B4-BE49-F238E27FC236}">
-                <a16:creationId xmlns:a16="http://schemas.microsoft.com/office/drawing/2014/main" id="{90E5453F-445B-46BF-A158-06F7744EFDCD}"/>
-              </a:ext>
-            </a:extLst>
-          </p:cNvPr>
-          <p:cNvCxnSpPr/>
-          <p:nvPr/>
-        </p:nvCxnSpPr>
-        <p:spPr>
-          <a:xfrm flipH="1">
-            <a:off x="3276600" y="1794527"/>
-            <a:ext cx="1518920" cy="908033"/>
-          </a:xfrm>
-          <a:prstGeom prst="line">
-            <a:avLst/>
-          </a:prstGeom>
-          <a:ln>
-            <a:prstDash val="lgDash"/>
-          </a:ln>
-        </p:spPr>
-        <p:style>
-          <a:lnRef idx="1">
-            <a:schemeClr val="accent1"/>
-          </a:lnRef>
-          <a:fillRef idx="0">
-            <a:schemeClr val="accent1"/>
-          </a:fillRef>
-          <a:effectRef idx="0">
-            <a:schemeClr val="accent1"/>
-          </a:effectRef>
-          <a:fontRef idx="minor">
-            <a:schemeClr val="tx1"/>
-          </a:fontRef>
-        </p:style>
-      </p:cxnSp>
-      <p:cxnSp>
-        <p:nvCxnSpPr>
-          <p:cNvPr id="44" name="Straight Connector 43">
-            <a:extLst>
-              <a:ext uri="{FF2B5EF4-FFF2-40B4-BE49-F238E27FC236}">
-                <a16:creationId xmlns:a16="http://schemas.microsoft.com/office/drawing/2014/main" id="{4BC26EC4-CD9E-41D1-A083-29D7EC6EBBDB}"/>
-              </a:ext>
-            </a:extLst>
-          </p:cNvPr>
-          <p:cNvCxnSpPr/>
-          <p:nvPr/>
-        </p:nvCxnSpPr>
-        <p:spPr>
-          <a:xfrm>
-            <a:off x="6654800" y="1794527"/>
-            <a:ext cx="1518920" cy="908033"/>
-          </a:xfrm>
-          <a:prstGeom prst="line">
-            <a:avLst/>
-          </a:prstGeom>
-          <a:ln>
-            <a:prstDash val="lgDash"/>
-          </a:ln>
-        </p:spPr>
-        <p:style>
-          <a:lnRef idx="1">
-            <a:schemeClr val="accent1"/>
-          </a:lnRef>
-          <a:fillRef idx="0">
-            <a:schemeClr val="accent1"/>
-          </a:fillRef>
-          <a:effectRef idx="0">
-            <a:schemeClr val="accent1"/>
-          </a:effectRef>
-          <a:fontRef idx="minor">
-            <a:schemeClr val="tx1"/>
-          </a:fontRef>
-        </p:style>
-      </p:cxnSp>
-      <p:cxnSp>
-        <p:nvCxnSpPr>
-          <p:cNvPr id="82" name="Straight Connector 81">
-            <a:extLst>
-              <a:ext uri="{FF2B5EF4-FFF2-40B4-BE49-F238E27FC236}">
-                <a16:creationId xmlns:a16="http://schemas.microsoft.com/office/drawing/2014/main" id="{106C8F6A-D7F6-4A76-B27A-1C1E29C1F8C7}"/>
-              </a:ext>
-            </a:extLst>
-          </p:cNvPr>
-          <p:cNvCxnSpPr>
-            <a:cxnSpLocks/>
-            <a:stCxn id="10" idx="3"/>
-            <a:endCxn id="11" idx="1"/>
-          </p:cNvCxnSpPr>
-          <p:nvPr/>
-        </p:nvCxnSpPr>
-        <p:spPr>
-          <a:xfrm>
-            <a:off x="5885819" y="3549633"/>
-            <a:ext cx="853940" cy="0"/>
-          </a:xfrm>
-          <a:prstGeom prst="line">
-            <a:avLst/>
-          </a:prstGeom>
-        </p:spPr>
-        <p:style>
-          <a:lnRef idx="1">
-            <a:schemeClr val="accent1"/>
-          </a:lnRef>
-          <a:fillRef idx="0">
-            <a:schemeClr val="accent1"/>
-          </a:fillRef>
-          <a:effectRef idx="0">
-            <a:schemeClr val="accent1"/>
-          </a:effectRef>
-          <a:fontRef idx="minor">
-            <a:schemeClr val="tx1"/>
-          </a:fontRef>
-        </p:style>
-      </p:cxnSp>
-      <p:cxnSp>
-        <p:nvCxnSpPr>
-          <p:cNvPr id="86" name="Straight Connector 85">
-            <a:extLst>
-              <a:ext uri="{FF2B5EF4-FFF2-40B4-BE49-F238E27FC236}">
-                <a16:creationId xmlns:a16="http://schemas.microsoft.com/office/drawing/2014/main" id="{3BDCE5BD-9078-4841-9826-B52AF3E22E9B}"/>
-              </a:ext>
-            </a:extLst>
-          </p:cNvPr>
-          <p:cNvCxnSpPr>
-            <a:cxnSpLocks/>
-            <a:stCxn id="15" idx="3"/>
-          </p:cNvCxnSpPr>
-          <p:nvPr/>
-        </p:nvCxnSpPr>
-        <p:spPr>
-          <a:xfrm flipV="1">
-            <a:off x="6106004" y="4757600"/>
-            <a:ext cx="539810" cy="806941"/>
-          </a:xfrm>
-          <a:prstGeom prst="line">
-            <a:avLst/>
-          </a:prstGeom>
-        </p:spPr>
-        <p:style>
-          <a:lnRef idx="1">
-            <a:schemeClr val="accent1"/>
-          </a:lnRef>
-          <a:fillRef idx="0">
-            <a:schemeClr val="accent1"/>
-          </a:fillRef>
-          <a:effectRef idx="0">
-            <a:schemeClr val="accent1"/>
-          </a:effectRef>
-          <a:fontRef idx="minor">
-            <a:schemeClr val="tx1"/>
-          </a:fontRef>
-        </p:style>
-      </p:cxnSp>
-      <p:cxnSp>
-        <p:nvCxnSpPr>
-          <p:cNvPr id="88" name="Straight Connector 87">
-            <a:extLst>
-              <a:ext uri="{FF2B5EF4-FFF2-40B4-BE49-F238E27FC236}">
-                <a16:creationId xmlns:a16="http://schemas.microsoft.com/office/drawing/2014/main" id="{E18A69A8-E424-4E3D-ABEB-6B81578C0925}"/>
-              </a:ext>
-            </a:extLst>
-          </p:cNvPr>
-          <p:cNvCxnSpPr>
-            <a:stCxn id="10" idx="2"/>
-            <a:endCxn id="15" idx="0"/>
-          </p:cNvCxnSpPr>
-          <p:nvPr/>
-        </p:nvCxnSpPr>
-        <p:spPr>
-          <a:xfrm flipH="1">
-            <a:off x="5279709" y="3918352"/>
-            <a:ext cx="1" cy="1208011"/>
-          </a:xfrm>
-          <a:prstGeom prst="line">
-            <a:avLst/>
-          </a:prstGeom>
-        </p:spPr>
-        <p:style>
-          <a:lnRef idx="1">
-            <a:schemeClr val="accent1"/>
-          </a:lnRef>
-          <a:fillRef idx="0">
-            <a:schemeClr val="accent1"/>
-          </a:fillRef>
-          <a:effectRef idx="0">
-            <a:schemeClr val="accent1"/>
-          </a:effectRef>
-          <a:fontRef idx="minor">
-            <a:schemeClr val="tx1"/>
-          </a:fontRef>
-        </p:style>
-      </p:cxnSp>
-      <p:cxnSp>
-        <p:nvCxnSpPr>
-          <p:cNvPr id="103" name="Straight Connector 102">
-            <a:extLst>
-              <a:ext uri="{FF2B5EF4-FFF2-40B4-BE49-F238E27FC236}">
-                <a16:creationId xmlns:a16="http://schemas.microsoft.com/office/drawing/2014/main" id="{7FAC8785-4BB1-4259-A7F3-7AF70C333B93}"/>
-              </a:ext>
-            </a:extLst>
-          </p:cNvPr>
-          <p:cNvCxnSpPr>
-            <a:cxnSpLocks/>
-            <a:stCxn id="10" idx="1"/>
-          </p:cNvCxnSpPr>
-          <p:nvPr/>
-        </p:nvCxnSpPr>
-        <p:spPr>
-          <a:xfrm flipH="1">
-            <a:off x="3819660" y="3549633"/>
-            <a:ext cx="853940" cy="850626"/>
-          </a:xfrm>
-          <a:prstGeom prst="line">
-            <a:avLst/>
-          </a:prstGeom>
-        </p:spPr>
-        <p:style>
-          <a:lnRef idx="1">
-            <a:schemeClr val="accent1"/>
-          </a:lnRef>
-          <a:fillRef idx="0">
-            <a:schemeClr val="accent1"/>
-          </a:fillRef>
-          <a:effectRef idx="0">
-            <a:schemeClr val="accent1"/>
-          </a:effectRef>
-          <a:fontRef idx="minor">
-            <a:schemeClr val="tx1"/>
-          </a:fontRef>
-        </p:style>
-      </p:cxnSp>
-      <p:cxnSp>
-        <p:nvCxnSpPr>
-          <p:cNvPr id="105" name="Straight Connector 104">
-            <a:extLst>
-              <a:ext uri="{FF2B5EF4-FFF2-40B4-BE49-F238E27FC236}">
-                <a16:creationId xmlns:a16="http://schemas.microsoft.com/office/drawing/2014/main" id="{8380589A-8278-4EF2-98CD-6656D893F935}"/>
-              </a:ext>
-            </a:extLst>
-          </p:cNvPr>
-          <p:cNvCxnSpPr>
-            <a:cxnSpLocks/>
-            <a:endCxn id="15" idx="1"/>
-          </p:cNvCxnSpPr>
-          <p:nvPr/>
-        </p:nvCxnSpPr>
-        <p:spPr>
-          <a:xfrm>
-            <a:off x="3819660" y="4769591"/>
-            <a:ext cx="633754" cy="794950"/>
-          </a:xfrm>
-          <a:prstGeom prst="line">
-            <a:avLst/>
-          </a:prstGeom>
-        </p:spPr>
-        <p:style>
-          <a:lnRef idx="1">
-            <a:schemeClr val="accent1"/>
-          </a:lnRef>
-          <a:fillRef idx="0">
-            <a:schemeClr val="accent1"/>
-          </a:fillRef>
-          <a:effectRef idx="0">
-            <a:schemeClr val="accent1"/>
-          </a:effectRef>
-          <a:fontRef idx="minor">
-            <a:schemeClr val="tx1"/>
-          </a:fontRef>
-        </p:style>
-      </p:cxnSp>
-      <p:cxnSp>
-        <p:nvCxnSpPr>
-          <p:cNvPr id="107" name="Straight Connector 106">
-            <a:extLst>
-              <a:ext uri="{FF2B5EF4-FFF2-40B4-BE49-F238E27FC236}">
-                <a16:creationId xmlns:a16="http://schemas.microsoft.com/office/drawing/2014/main" id="{F8758519-E254-4655-AAB9-D6591C336F19}"/>
-              </a:ext>
-            </a:extLst>
-          </p:cNvPr>
-          <p:cNvCxnSpPr>
-            <a:cxnSpLocks/>
-            <a:stCxn id="10" idx="3"/>
-          </p:cNvCxnSpPr>
-          <p:nvPr/>
-        </p:nvCxnSpPr>
-        <p:spPr>
-          <a:xfrm>
-            <a:off x="5885819" y="3549633"/>
-            <a:ext cx="759995" cy="838635"/>
-          </a:xfrm>
-          <a:prstGeom prst="line">
-            <a:avLst/>
-          </a:prstGeom>
-        </p:spPr>
-        <p:style>
-          <a:lnRef idx="1">
-            <a:schemeClr val="accent1"/>
-          </a:lnRef>
-          <a:fillRef idx="0">
-            <a:schemeClr val="accent1"/>
-          </a:fillRef>
-          <a:effectRef idx="0">
-            <a:schemeClr val="accent1"/>
-          </a:effectRef>
-          <a:fontRef idx="minor">
-            <a:schemeClr val="tx1"/>
-          </a:fontRef>
-        </p:style>
-      </p:cxnSp>
-      <p:sp>
-        <p:nvSpPr>
-          <p:cNvPr id="124" name="TextBox 123">
-            <a:extLst>
-              <a:ext uri="{FF2B5EF4-FFF2-40B4-BE49-F238E27FC236}">
-                <a16:creationId xmlns:a16="http://schemas.microsoft.com/office/drawing/2014/main" id="{FC0BAA4C-B3E5-485E-9ACE-11DA8C31F906}"/>
-              </a:ext>
-            </a:extLst>
-          </p:cNvPr>
-          <p:cNvSpPr txBox="1"/>
-          <p:nvPr/>
-        </p:nvSpPr>
-        <p:spPr>
-          <a:xfrm>
-            <a:off x="8001626" y="1500243"/>
-            <a:ext cx="821059" cy="369332"/>
-          </a:xfrm>
-          <a:prstGeom prst="rect">
-            <a:avLst/>
-          </a:prstGeom>
-          <a:noFill/>
-        </p:spPr>
-        <p:txBody>
-          <a:bodyPr wrap="none" rtlCol="0">
-            <a:spAutoFit/>
-          </a:bodyPr>
-          <a:lstStyle/>
-          <a:p>
-            <a:r>
-              <a:rPr lang="he-IL" dirty="0"/>
-              <a:t>לקוחות</a:t>
-            </a:r>
-          </a:p>
-        </p:txBody>
-      </p:sp>
-      <p:pic>
-        <p:nvPicPr>
-          <p:cNvPr id="125" name="Picture 2" descr="Image result for users">
-            <a:extLst>
-              <a:ext uri="{FF2B5EF4-FFF2-40B4-BE49-F238E27FC236}">
-                <a16:creationId xmlns:a16="http://schemas.microsoft.com/office/drawing/2014/main" id="{B29C895E-E5F6-457C-8933-2531BF8CA9C3}"/>
-              </a:ext>
-            </a:extLst>
-          </p:cNvPr>
-          <p:cNvPicPr>
-            <a:picLocks noChangeAspect="1" noChangeArrowheads="1"/>
-          </p:cNvPicPr>
-          <p:nvPr/>
-        </p:nvPicPr>
-        <p:blipFill>
-          <a:blip r:embed="rId2" cstate="hqprint">
-            <a:extLst>
-              <a:ext uri="{28A0092B-C50C-407E-A947-70E740481C1C}">
-                <a14:useLocalDpi xmlns:a14="http://schemas.microsoft.com/office/drawing/2010/main" val="0"/>
-              </a:ext>
-            </a:extLst>
-          </a:blip>
-          <a:srcRect/>
-          <a:stretch>
-            <a:fillRect/>
-          </a:stretch>
-        </p:blipFill>
-        <p:spPr bwMode="auto">
-          <a:xfrm>
-            <a:off x="6379009" y="4269508"/>
-            <a:ext cx="551581" cy="630831"/>
-          </a:xfrm>
-          <a:prstGeom prst="rect">
-            <a:avLst/>
-          </a:prstGeom>
-          <a:noFill/>
-          <a:extLst>
-            <a:ext uri="{909E8E84-426E-40DD-AFC4-6F175D3DCCD1}">
-              <a14:hiddenFill xmlns:a14="http://schemas.microsoft.com/office/drawing/2010/main">
-                <a:solidFill>
-                  <a:srgbClr val="FFFFFF"/>
-                </a:solidFill>
-              </a14:hiddenFill>
-            </a:ext>
-          </a:extLst>
-        </p:spPr>
-      </p:pic>
-      <p:sp>
-        <p:nvSpPr>
-          <p:cNvPr id="129" name="TextBox 128">
-            <a:extLst>
-              <a:ext uri="{FF2B5EF4-FFF2-40B4-BE49-F238E27FC236}">
-                <a16:creationId xmlns:a16="http://schemas.microsoft.com/office/drawing/2014/main" id="{1EF8C442-78BA-49CA-A9A5-984871E90A08}"/>
-              </a:ext>
-            </a:extLst>
-          </p:cNvPr>
-          <p:cNvSpPr txBox="1"/>
-          <p:nvPr/>
-        </p:nvSpPr>
-        <p:spPr>
-          <a:xfrm>
-            <a:off x="6912618" y="4254008"/>
-            <a:ext cx="965356" cy="646331"/>
-          </a:xfrm>
-          <a:prstGeom prst="rect">
-            <a:avLst/>
-          </a:prstGeom>
-          <a:noFill/>
-        </p:spPr>
-        <p:txBody>
-          <a:bodyPr wrap="square" rtlCol="0">
-            <a:spAutoFit/>
-          </a:bodyPr>
-          <a:lstStyle/>
-          <a:p>
-            <a:r>
-              <a:rPr lang="he-IL" dirty="0"/>
-              <a:t>מנהלות חניונים</a:t>
-            </a:r>
-          </a:p>
-        </p:txBody>
-      </p:sp>
-      <p:pic>
-        <p:nvPicPr>
-          <p:cNvPr id="130" name="Picture 2" descr="Image result for users">
-            <a:extLst>
-              <a:ext uri="{FF2B5EF4-FFF2-40B4-BE49-F238E27FC236}">
-                <a16:creationId xmlns:a16="http://schemas.microsoft.com/office/drawing/2014/main" id="{9C392B1B-CA6D-42BA-8003-45CE425ED166}"/>
-              </a:ext>
-            </a:extLst>
-          </p:cNvPr>
-          <p:cNvPicPr>
-            <a:picLocks noChangeAspect="1" noChangeArrowheads="1"/>
-          </p:cNvPicPr>
-          <p:nvPr/>
-        </p:nvPicPr>
-        <p:blipFill>
-          <a:blip r:embed="rId2" cstate="hqprint">
-            <a:extLst>
-              <a:ext uri="{28A0092B-C50C-407E-A947-70E740481C1C}">
-                <a14:useLocalDpi xmlns:a14="http://schemas.microsoft.com/office/drawing/2010/main" val="0"/>
-              </a:ext>
-            </a:extLst>
-          </a:blip>
-          <a:srcRect/>
-          <a:stretch>
-            <a:fillRect/>
-          </a:stretch>
-        </p:blipFill>
-        <p:spPr bwMode="auto">
-          <a:xfrm>
-            <a:off x="3556342" y="4269508"/>
-            <a:ext cx="551581" cy="630831"/>
-          </a:xfrm>
-          <a:prstGeom prst="rect">
-            <a:avLst/>
-          </a:prstGeom>
-          <a:noFill/>
-          <a:extLst>
-            <a:ext uri="{909E8E84-426E-40DD-AFC4-6F175D3DCCD1}">
-              <a14:hiddenFill xmlns:a14="http://schemas.microsoft.com/office/drawing/2010/main">
-                <a:solidFill>
-                  <a:srgbClr val="FFFFFF"/>
-                </a:solidFill>
-              </a14:hiddenFill>
-            </a:ext>
-          </a:extLst>
-        </p:spPr>
-      </p:pic>
-      <p:sp>
-        <p:nvSpPr>
-          <p:cNvPr id="131" name="TextBox 130">
-            <a:extLst>
-              <a:ext uri="{FF2B5EF4-FFF2-40B4-BE49-F238E27FC236}">
-                <a16:creationId xmlns:a16="http://schemas.microsoft.com/office/drawing/2014/main" id="{3A593558-F10C-49E3-9ADA-277CDA594BC1}"/>
-              </a:ext>
-            </a:extLst>
-          </p:cNvPr>
-          <p:cNvSpPr txBox="1"/>
-          <p:nvPr/>
-        </p:nvSpPr>
-        <p:spPr>
-          <a:xfrm>
-            <a:off x="4098643" y="4388268"/>
-            <a:ext cx="813043" cy="369332"/>
-          </a:xfrm>
-          <a:prstGeom prst="rect">
-            <a:avLst/>
-          </a:prstGeom>
-          <a:noFill/>
-        </p:spPr>
-        <p:txBody>
-          <a:bodyPr wrap="none" rtlCol="0">
-            <a:spAutoFit/>
-          </a:bodyPr>
-          <a:lstStyle/>
-          <a:p>
-            <a:r>
-              <a:rPr lang="he-IL" dirty="0"/>
-              <a:t>עובדות</a:t>
-            </a:r>
-          </a:p>
-        </p:txBody>
-      </p:sp>
-      <p:pic>
-        <p:nvPicPr>
-          <p:cNvPr id="140" name="Picture 2" descr="Image result for users">
-            <a:extLst>
-              <a:ext uri="{FF2B5EF4-FFF2-40B4-BE49-F238E27FC236}">
-                <a16:creationId xmlns:a16="http://schemas.microsoft.com/office/drawing/2014/main" id="{432E3C36-FED1-4D7B-8D78-EC9BB72C3760}"/>
-              </a:ext>
-            </a:extLst>
-          </p:cNvPr>
-          <p:cNvPicPr>
-            <a:picLocks noChangeAspect="1" noChangeArrowheads="1"/>
-          </p:cNvPicPr>
-          <p:nvPr/>
-        </p:nvPicPr>
-        <p:blipFill>
-          <a:blip r:embed="rId2" cstate="hqprint">
-            <a:extLst>
-              <a:ext uri="{28A0092B-C50C-407E-A947-70E740481C1C}">
-                <a14:useLocalDpi xmlns:a14="http://schemas.microsoft.com/office/drawing/2010/main" val="0"/>
-              </a:ext>
-            </a:extLst>
-          </a:blip>
-          <a:srcRect/>
-          <a:stretch>
-            <a:fillRect/>
-          </a:stretch>
-        </p:blipFill>
-        <p:spPr bwMode="auto">
-          <a:xfrm>
-            <a:off x="7450045" y="1404900"/>
-            <a:ext cx="551581" cy="630831"/>
-          </a:xfrm>
-          <a:prstGeom prst="rect">
-            <a:avLst/>
-          </a:prstGeom>
-          <a:noFill/>
-          <a:extLst>
-            <a:ext uri="{909E8E84-426E-40DD-AFC4-6F175D3DCCD1}">
-              <a14:hiddenFill xmlns:a14="http://schemas.microsoft.com/office/drawing/2010/main">
-                <a:solidFill>
-                  <a:srgbClr val="FFFFFF"/>
-                </a:solidFill>
-              </a14:hiddenFill>
-            </a:ext>
-          </a:extLst>
-        </p:spPr>
-      </p:pic>
-      <p:pic>
-        <p:nvPicPr>
-          <p:cNvPr id="1031" name="Picture 6" descr="Image result for user">
-            <a:extLst>
-              <a:ext uri="{FF2B5EF4-FFF2-40B4-BE49-F238E27FC236}">
-                <a16:creationId xmlns:a16="http://schemas.microsoft.com/office/drawing/2014/main" id="{EF7B53A0-C020-4D77-B795-6013E3C0566C}"/>
-              </a:ext>
-            </a:extLst>
-          </p:cNvPr>
-          <p:cNvPicPr>
-            <a:picLocks noChangeAspect="1" noChangeArrowheads="1"/>
-          </p:cNvPicPr>
-          <p:nvPr/>
-        </p:nvPicPr>
-        <p:blipFill>
-          <a:blip r:embed="rId3" cstate="hqprint">
-            <a:extLst>
-              <a:ext uri="{28A0092B-C50C-407E-A947-70E740481C1C}">
-                <a14:useLocalDpi xmlns:a14="http://schemas.microsoft.com/office/drawing/2010/main" val="0"/>
-              </a:ext>
-            </a:extLst>
-          </a:blip>
-          <a:srcRect/>
-          <a:stretch>
-            <a:fillRect/>
-          </a:stretch>
-        </p:blipFill>
-        <p:spPr bwMode="auto">
-          <a:xfrm>
-            <a:off x="4011014" y="866683"/>
-            <a:ext cx="386883" cy="594429"/>
-          </a:xfrm>
-          <a:prstGeom prst="rect">
-            <a:avLst/>
-          </a:prstGeom>
-          <a:noFill/>
-          <a:extLst>
-            <a:ext uri="{909E8E84-426E-40DD-AFC4-6F175D3DCCD1}">
-              <a14:hiddenFill xmlns:a14="http://schemas.microsoft.com/office/drawing/2010/main">
-                <a:solidFill>
-                  <a:srgbClr val="FFFFFF"/>
-                </a:solidFill>
-              </a14:hiddenFill>
-            </a:ext>
-          </a:extLst>
-        </p:spPr>
-      </p:pic>
-      <p:sp>
-        <p:nvSpPr>
-          <p:cNvPr id="143" name="TextBox 142">
-            <a:extLst>
-              <a:ext uri="{FF2B5EF4-FFF2-40B4-BE49-F238E27FC236}">
-                <a16:creationId xmlns:a16="http://schemas.microsoft.com/office/drawing/2014/main" id="{A9D28CA4-F33E-4BFA-B0EE-9C97C6191D79}"/>
-              </a:ext>
-            </a:extLst>
-          </p:cNvPr>
-          <p:cNvSpPr txBox="1"/>
-          <p:nvPr/>
-        </p:nvSpPr>
-        <p:spPr>
-          <a:xfrm>
-            <a:off x="3087238" y="840731"/>
-            <a:ext cx="948822" cy="646331"/>
-          </a:xfrm>
-          <a:prstGeom prst="rect">
-            <a:avLst/>
-          </a:prstGeom>
-          <a:noFill/>
-        </p:spPr>
-        <p:txBody>
-          <a:bodyPr wrap="square" rtlCol="0">
-            <a:spAutoFit/>
-          </a:bodyPr>
-          <a:lstStyle/>
-          <a:p>
-            <a:pPr algn="ctr"/>
-            <a:r>
-              <a:rPr lang="he-IL" dirty="0"/>
-              <a:t>מנהלת הרשת</a:t>
-            </a:r>
-          </a:p>
-        </p:txBody>
-      </p:sp>
-    </p:spTree>
-    <p:extLst>
-      <p:ext uri="{BB962C8B-B14F-4D97-AF65-F5344CB8AC3E}">
-        <p14:creationId xmlns:p14="http://schemas.microsoft.com/office/powerpoint/2010/main" val="2092963246"/>
-      </p:ext>
-    </p:extLst>
-  </p:cSld>
-  <p:clrMapOvr>
-    <a:masterClrMapping/>
-  </p:clrMapOvr>
-</p:sld>
-</file>
-
-<file path=ppt/slides/slide2.xml><?xml version="1.0" encoding="utf-8"?>
-<p:sld xmlns:a="http://schemas.openxmlformats.org/drawingml/2006/main" xmlns:r="http://schemas.openxmlformats.org/officeDocument/2006/relationships" xmlns:p="http://schemas.openxmlformats.org/presentationml/2006/main">
-  <p:cSld>
-    <p:spTree>
-      <p:nvGrpSpPr>
-        <p:cNvPr id="1" name=""/>
-        <p:cNvGrpSpPr/>
-        <p:nvPr/>
-      </p:nvGrpSpPr>
-      <p:grpSpPr>
-        <a:xfrm>
-          <a:off x="0" y="0"/>
-          <a:ext cx="0" cy="0"/>
-          <a:chOff x="0" y="0"/>
-          <a:chExt cx="0" cy="0"/>
-        </a:xfrm>
-      </p:grpSpPr>
-      <p:grpSp>
-        <p:nvGrpSpPr>
-          <p:cNvPr id="18" name="Group 17">
-            <a:extLst>
-              <a:ext uri="{FF2B5EF4-FFF2-40B4-BE49-F238E27FC236}">
-                <a16:creationId xmlns:a16="http://schemas.microsoft.com/office/drawing/2014/main" id="{DAD24C13-C526-49A0-A9AF-7CDD3FD98AEB}"/>
-              </a:ext>
-            </a:extLst>
-          </p:cNvPr>
-          <p:cNvGrpSpPr/>
-          <p:nvPr/>
-        </p:nvGrpSpPr>
-        <p:grpSpPr>
-          <a:xfrm>
-            <a:off x="394788" y="2089313"/>
-            <a:ext cx="844222" cy="1875451"/>
-            <a:chOff x="1763484" y="989045"/>
-            <a:chExt cx="1474239" cy="3275045"/>
-          </a:xfrm>
-        </p:grpSpPr>
-        <p:sp>
-          <p:nvSpPr>
-            <p:cNvPr id="4" name="Oval 3">
-              <a:extLst>
-                <a:ext uri="{FF2B5EF4-FFF2-40B4-BE49-F238E27FC236}">
-                  <a16:creationId xmlns:a16="http://schemas.microsoft.com/office/drawing/2014/main" id="{31ECE892-9C56-4934-9CD1-4B9E50949F7B}"/>
-                </a:ext>
-              </a:extLst>
-            </p:cNvPr>
-            <p:cNvSpPr/>
-            <p:nvPr/>
-          </p:nvSpPr>
-          <p:spPr>
-            <a:xfrm>
-              <a:off x="2034074" y="989045"/>
-              <a:ext cx="933061" cy="933061"/>
-            </a:xfrm>
-            <a:prstGeom prst="ellipse">
-              <a:avLst/>
-            </a:prstGeom>
-            <a:noFill/>
-            <a:ln w="19050"/>
-          </p:spPr>
-          <p:style>
-            <a:lnRef idx="2">
-              <a:schemeClr val="accent1">
-                <a:shade val="50000"/>
-              </a:schemeClr>
-            </a:lnRef>
-            <a:fillRef idx="1">
-              <a:schemeClr val="accent1"/>
-            </a:fillRef>
-            <a:effectRef idx="0">
-              <a:schemeClr val="accent1"/>
-            </a:effectRef>
-            <a:fontRef idx="minor">
-              <a:schemeClr val="lt1"/>
-            </a:fontRef>
-          </p:style>
-          <p:txBody>
-            <a:bodyPr rtlCol="0" anchor="ctr"/>
-            <a:lstStyle/>
-            <a:p>
-              <a:pPr algn="ctr"/>
-              <a:endParaRPr lang="en-US">
-                <a:solidFill>
-                  <a:schemeClr val="tx1"/>
-                </a:solidFill>
-              </a:endParaRPr>
-            </a:p>
-          </p:txBody>
-        </p:sp>
-        <p:cxnSp>
-          <p:nvCxnSpPr>
-            <p:cNvPr id="6" name="Straight Connector 5">
-              <a:extLst>
-                <a:ext uri="{FF2B5EF4-FFF2-40B4-BE49-F238E27FC236}">
-                  <a16:creationId xmlns:a16="http://schemas.microsoft.com/office/drawing/2014/main" id="{B8EC415C-4309-4E51-9FA2-454B943C0B4D}"/>
-                </a:ext>
-              </a:extLst>
-            </p:cNvPr>
-            <p:cNvCxnSpPr>
-              <a:cxnSpLocks/>
-              <a:stCxn id="4" idx="4"/>
-            </p:cNvCxnSpPr>
-            <p:nvPr/>
-          </p:nvCxnSpPr>
-          <p:spPr>
-            <a:xfrm>
-              <a:off x="2500605" y="1922106"/>
-              <a:ext cx="0" cy="1306286"/>
-            </a:xfrm>
-            <a:prstGeom prst="line">
-              <a:avLst/>
-            </a:prstGeom>
-            <a:ln w="19050"/>
-          </p:spPr>
-          <p:style>
-            <a:lnRef idx="1">
-              <a:schemeClr val="accent1"/>
-            </a:lnRef>
-            <a:fillRef idx="0">
-              <a:schemeClr val="accent1"/>
-            </a:fillRef>
-            <a:effectRef idx="0">
-              <a:schemeClr val="accent1"/>
-            </a:effectRef>
-            <a:fontRef idx="minor">
-              <a:schemeClr val="tx1"/>
-            </a:fontRef>
-          </p:style>
-        </p:cxnSp>
-        <p:cxnSp>
-          <p:nvCxnSpPr>
-            <p:cNvPr id="10" name="Straight Connector 9">
-              <a:extLst>
-                <a:ext uri="{FF2B5EF4-FFF2-40B4-BE49-F238E27FC236}">
-                  <a16:creationId xmlns:a16="http://schemas.microsoft.com/office/drawing/2014/main" id="{3544F51D-351A-4E16-8D4B-5F12569551E9}"/>
-                </a:ext>
-              </a:extLst>
-            </p:cNvPr>
-            <p:cNvCxnSpPr>
-              <a:cxnSpLocks/>
-            </p:cNvCxnSpPr>
-            <p:nvPr/>
-          </p:nvCxnSpPr>
-          <p:spPr>
-            <a:xfrm flipH="1">
-              <a:off x="1763485" y="3228392"/>
-              <a:ext cx="737118" cy="1035698"/>
-            </a:xfrm>
-            <a:prstGeom prst="line">
-              <a:avLst/>
-            </a:prstGeom>
-            <a:ln w="19050"/>
-          </p:spPr>
-          <p:style>
-            <a:lnRef idx="1">
-              <a:schemeClr val="accent1"/>
-            </a:lnRef>
-            <a:fillRef idx="0">
-              <a:schemeClr val="accent1"/>
-            </a:fillRef>
-            <a:effectRef idx="0">
-              <a:schemeClr val="accent1"/>
-            </a:effectRef>
-            <a:fontRef idx="minor">
-              <a:schemeClr val="tx1"/>
-            </a:fontRef>
-          </p:style>
-        </p:cxnSp>
-        <p:cxnSp>
-          <p:nvCxnSpPr>
-            <p:cNvPr id="12" name="Straight Connector 11">
-              <a:extLst>
-                <a:ext uri="{FF2B5EF4-FFF2-40B4-BE49-F238E27FC236}">
-                  <a16:creationId xmlns:a16="http://schemas.microsoft.com/office/drawing/2014/main" id="{89CC822C-6FE2-4B57-ADEC-7FEF3A349084}"/>
-                </a:ext>
-              </a:extLst>
-            </p:cNvPr>
-            <p:cNvCxnSpPr>
-              <a:cxnSpLocks/>
-            </p:cNvCxnSpPr>
-            <p:nvPr/>
-          </p:nvCxnSpPr>
-          <p:spPr>
-            <a:xfrm>
-              <a:off x="2500603" y="3228392"/>
-              <a:ext cx="737120" cy="1035698"/>
-            </a:xfrm>
-            <a:prstGeom prst="line">
-              <a:avLst/>
-            </a:prstGeom>
-            <a:ln w="19050"/>
-          </p:spPr>
-          <p:style>
-            <a:lnRef idx="1">
-              <a:schemeClr val="accent1"/>
-            </a:lnRef>
-            <a:fillRef idx="0">
-              <a:schemeClr val="accent1"/>
-            </a:fillRef>
-            <a:effectRef idx="0">
-              <a:schemeClr val="accent1"/>
-            </a:effectRef>
-            <a:fontRef idx="minor">
-              <a:schemeClr val="tx1"/>
-            </a:fontRef>
-          </p:style>
-        </p:cxnSp>
-        <p:cxnSp>
-          <p:nvCxnSpPr>
-            <p:cNvPr id="14" name="Straight Connector 13">
-              <a:extLst>
-                <a:ext uri="{FF2B5EF4-FFF2-40B4-BE49-F238E27FC236}">
-                  <a16:creationId xmlns:a16="http://schemas.microsoft.com/office/drawing/2014/main" id="{C3AC21BA-0C0B-4B82-8982-ABBFC34B01D8}"/>
-                </a:ext>
-              </a:extLst>
-            </p:cNvPr>
-            <p:cNvCxnSpPr>
-              <a:cxnSpLocks/>
-            </p:cNvCxnSpPr>
-            <p:nvPr/>
-          </p:nvCxnSpPr>
-          <p:spPr>
-            <a:xfrm>
-              <a:off x="1763484" y="2416623"/>
-              <a:ext cx="1474239" cy="0"/>
-            </a:xfrm>
-            <a:prstGeom prst="line">
-              <a:avLst/>
-            </a:prstGeom>
-            <a:ln w="19050"/>
-          </p:spPr>
-          <p:style>
-            <a:lnRef idx="1">
-              <a:schemeClr val="accent1"/>
-            </a:lnRef>
-            <a:fillRef idx="0">
-              <a:schemeClr val="accent1"/>
-            </a:fillRef>
-            <a:effectRef idx="0">
-              <a:schemeClr val="accent1"/>
-            </a:effectRef>
-            <a:fontRef idx="minor">
-              <a:schemeClr val="tx1"/>
-            </a:fontRef>
-          </p:style>
-        </p:cxnSp>
-      </p:grpSp>
-      <p:sp>
-        <p:nvSpPr>
-          <p:cNvPr id="22" name="TextBox 21">
-            <a:extLst>
-              <a:ext uri="{FF2B5EF4-FFF2-40B4-BE49-F238E27FC236}">
-                <a16:creationId xmlns:a16="http://schemas.microsoft.com/office/drawing/2014/main" id="{61813AE3-9D2D-4C3A-9FF8-322AB916B0FF}"/>
-              </a:ext>
-            </a:extLst>
-          </p:cNvPr>
-          <p:cNvSpPr txBox="1"/>
-          <p:nvPr/>
-        </p:nvSpPr>
-        <p:spPr>
-          <a:xfrm>
-            <a:off x="73899" y="4162926"/>
-            <a:ext cx="1486000" cy="369332"/>
-          </a:xfrm>
-          <a:prstGeom prst="rect">
-            <a:avLst/>
-          </a:prstGeom>
-          <a:noFill/>
-        </p:spPr>
-        <p:txBody>
-          <a:bodyPr wrap="square" rtlCol="0">
-            <a:spAutoFit/>
-          </a:bodyPr>
-          <a:lstStyle/>
-          <a:p>
-            <a:r>
-              <a:rPr lang="en-US" dirty="0"/>
-              <a:t>Administrator</a:t>
-            </a:r>
-          </a:p>
-        </p:txBody>
-      </p:sp>
-      <p:sp>
-        <p:nvSpPr>
-          <p:cNvPr id="23" name="Oval 22">
-            <a:extLst>
-              <a:ext uri="{FF2B5EF4-FFF2-40B4-BE49-F238E27FC236}">
-                <a16:creationId xmlns:a16="http://schemas.microsoft.com/office/drawing/2014/main" id="{3D6ACE74-3008-461A-B55E-D91549ADDBFA}"/>
-              </a:ext>
-            </a:extLst>
-          </p:cNvPr>
-          <p:cNvSpPr/>
-          <p:nvPr/>
-        </p:nvSpPr>
-        <p:spPr>
-          <a:xfrm>
-            <a:off x="2976155" y="223863"/>
-            <a:ext cx="2464525" cy="826234"/>
-          </a:xfrm>
-          <a:prstGeom prst="ellipse">
-            <a:avLst/>
-          </a:prstGeom>
-          <a:noFill/>
-          <a:ln w="19050"/>
-        </p:spPr>
-        <p:style>
-          <a:lnRef idx="2">
-            <a:schemeClr val="accent1">
-              <a:shade val="50000"/>
-            </a:schemeClr>
-          </a:lnRef>
-          <a:fillRef idx="1">
-            <a:schemeClr val="accent1"/>
-          </a:fillRef>
-          <a:effectRef idx="0">
-            <a:schemeClr val="accent1"/>
-          </a:effectRef>
-          <a:fontRef idx="minor">
-            <a:schemeClr val="lt1"/>
-          </a:fontRef>
-        </p:style>
-        <p:txBody>
-          <a:bodyPr rtlCol="0" anchor="ctr"/>
-          <a:lstStyle/>
-          <a:p>
-            <a:pPr algn="ctr"/>
-            <a:r>
-              <a:rPr lang="he-IL" sz="1600" dirty="0">
-                <a:solidFill>
-                  <a:schemeClr val="tx1"/>
-                </a:solidFill>
-              </a:rPr>
-              <a:t>הרשמה כמשתמשי מערכת</a:t>
-            </a:r>
-            <a:endParaRPr lang="en-US" sz="1600" dirty="0">
-              <a:solidFill>
-                <a:schemeClr val="tx1"/>
-              </a:solidFill>
-            </a:endParaRPr>
-          </a:p>
-        </p:txBody>
-      </p:sp>
-      <p:sp>
-        <p:nvSpPr>
-          <p:cNvPr id="24" name="Oval 23">
-            <a:extLst>
-              <a:ext uri="{FF2B5EF4-FFF2-40B4-BE49-F238E27FC236}">
-                <a16:creationId xmlns:a16="http://schemas.microsoft.com/office/drawing/2014/main" id="{5EFCBAD1-92BD-4614-B29A-7986098407B9}"/>
-              </a:ext>
-            </a:extLst>
-          </p:cNvPr>
-          <p:cNvSpPr/>
-          <p:nvPr/>
-        </p:nvSpPr>
-        <p:spPr>
-          <a:xfrm>
-            <a:off x="2976155" y="1156588"/>
-            <a:ext cx="2464525" cy="826234"/>
-          </a:xfrm>
-          <a:prstGeom prst="ellipse">
-            <a:avLst/>
-          </a:prstGeom>
-          <a:noFill/>
-          <a:ln w="19050"/>
-        </p:spPr>
-        <p:style>
-          <a:lnRef idx="2">
-            <a:schemeClr val="accent1">
-              <a:shade val="50000"/>
-            </a:schemeClr>
-          </a:lnRef>
-          <a:fillRef idx="1">
-            <a:schemeClr val="accent1"/>
-          </a:fillRef>
-          <a:effectRef idx="0">
-            <a:schemeClr val="accent1"/>
-          </a:effectRef>
-          <a:fontRef idx="minor">
-            <a:schemeClr val="lt1"/>
-          </a:fontRef>
-        </p:style>
-        <p:txBody>
-          <a:bodyPr rtlCol="0" anchor="ctr"/>
-          <a:lstStyle/>
-          <a:p>
-            <a:pPr algn="ctr"/>
-            <a:r>
-              <a:rPr lang="he-IL" sz="1600" dirty="0">
-                <a:solidFill>
-                  <a:schemeClr val="tx1"/>
-                </a:solidFill>
-              </a:rPr>
-              <a:t>קביעת תעריפים ועדכונם במערכת</a:t>
-            </a:r>
-            <a:endParaRPr lang="en-US" sz="1600" dirty="0">
-              <a:solidFill>
-                <a:schemeClr val="tx1"/>
-              </a:solidFill>
-            </a:endParaRPr>
-          </a:p>
-        </p:txBody>
-      </p:sp>
-      <p:sp>
-        <p:nvSpPr>
-          <p:cNvPr id="25" name="Oval 24">
-            <a:extLst>
-              <a:ext uri="{FF2B5EF4-FFF2-40B4-BE49-F238E27FC236}">
-                <a16:creationId xmlns:a16="http://schemas.microsoft.com/office/drawing/2014/main" id="{10B17985-D386-4420-A7BA-E2ADEF84064E}"/>
-              </a:ext>
-            </a:extLst>
-          </p:cNvPr>
-          <p:cNvSpPr/>
-          <p:nvPr/>
-        </p:nvSpPr>
-        <p:spPr>
-          <a:xfrm>
-            <a:off x="2976156" y="2089313"/>
-            <a:ext cx="2464525" cy="826234"/>
-          </a:xfrm>
-          <a:prstGeom prst="ellipse">
-            <a:avLst/>
-          </a:prstGeom>
-          <a:noFill/>
-          <a:ln w="19050"/>
-        </p:spPr>
-        <p:style>
-          <a:lnRef idx="2">
-            <a:schemeClr val="accent1">
-              <a:shade val="50000"/>
-            </a:schemeClr>
-          </a:lnRef>
-          <a:fillRef idx="1">
-            <a:schemeClr val="accent1"/>
-          </a:fillRef>
-          <a:effectRef idx="0">
-            <a:schemeClr val="accent1"/>
-          </a:effectRef>
-          <a:fontRef idx="minor">
-            <a:schemeClr val="lt1"/>
-          </a:fontRef>
-        </p:style>
-        <p:txBody>
-          <a:bodyPr rtlCol="0" anchor="ctr"/>
-          <a:lstStyle/>
-          <a:p>
-            <a:pPr algn="ctr"/>
-            <a:r>
-              <a:rPr lang="he-IL" sz="1600" dirty="0">
-                <a:solidFill>
-                  <a:schemeClr val="tx1"/>
-                </a:solidFill>
-              </a:rPr>
-              <a:t>הנפקת דו"ח תמונת מצב</a:t>
-            </a:r>
-            <a:endParaRPr lang="en-US" sz="1600" dirty="0">
-              <a:solidFill>
-                <a:schemeClr val="tx1"/>
-              </a:solidFill>
-            </a:endParaRPr>
-          </a:p>
-        </p:txBody>
-      </p:sp>
-      <p:sp>
-        <p:nvSpPr>
-          <p:cNvPr id="26" name="Oval 25">
-            <a:extLst>
-              <a:ext uri="{FF2B5EF4-FFF2-40B4-BE49-F238E27FC236}">
-                <a16:creationId xmlns:a16="http://schemas.microsoft.com/office/drawing/2014/main" id="{F12C4930-4AE8-4EDB-9529-3DA193C5D3F1}"/>
-              </a:ext>
-            </a:extLst>
-          </p:cNvPr>
-          <p:cNvSpPr/>
-          <p:nvPr/>
-        </p:nvSpPr>
-        <p:spPr>
-          <a:xfrm>
-            <a:off x="2976155" y="3022038"/>
-            <a:ext cx="2464525" cy="826234"/>
-          </a:xfrm>
-          <a:prstGeom prst="ellipse">
-            <a:avLst/>
-          </a:prstGeom>
-          <a:noFill/>
-          <a:ln w="19050"/>
-        </p:spPr>
-        <p:style>
-          <a:lnRef idx="2">
-            <a:schemeClr val="accent1">
-              <a:shade val="50000"/>
-            </a:schemeClr>
-          </a:lnRef>
-          <a:fillRef idx="1">
-            <a:schemeClr val="accent1"/>
-          </a:fillRef>
-          <a:effectRef idx="0">
-            <a:schemeClr val="accent1"/>
-          </a:effectRef>
-          <a:fontRef idx="minor">
-            <a:schemeClr val="lt1"/>
-          </a:fontRef>
-        </p:style>
-        <p:txBody>
-          <a:bodyPr rot="0" spcFirstLastPara="0" vertOverflow="overflow" horzOverflow="overflow" vert="horz" wrap="square" lIns="91440" tIns="45720" rIns="91440" bIns="45720" numCol="1" spcCol="0" rtlCol="0" fromWordArt="0" anchor="ctr" anchorCtr="0" forceAA="0" compatLnSpc="1">
-            <a:prstTxWarp prst="textNoShape">
-              <a:avLst/>
-            </a:prstTxWarp>
-            <a:noAutofit/>
-          </a:bodyPr>
-          <a:lstStyle/>
-          <a:p>
-            <a:pPr algn="ctr"/>
-            <a:r>
-              <a:rPr lang="he-IL" sz="1600" dirty="0">
-                <a:solidFill>
-                  <a:schemeClr val="tx1"/>
-                </a:solidFill>
-              </a:rPr>
-              <a:t>רישום מתקנים/מקומות חניה מושבתים</a:t>
-            </a:r>
-            <a:endParaRPr lang="en-US" sz="1600" dirty="0">
-              <a:solidFill>
-                <a:schemeClr val="tx1"/>
-              </a:solidFill>
-            </a:endParaRPr>
-          </a:p>
-        </p:txBody>
-      </p:sp>
-      <p:sp>
-        <p:nvSpPr>
-          <p:cNvPr id="30" name="Oval 29">
-            <a:extLst>
-              <a:ext uri="{FF2B5EF4-FFF2-40B4-BE49-F238E27FC236}">
-                <a16:creationId xmlns:a16="http://schemas.microsoft.com/office/drawing/2014/main" id="{8378904E-0C52-4FBB-B5EB-72D6947AC76D}"/>
-              </a:ext>
-            </a:extLst>
-          </p:cNvPr>
-          <p:cNvSpPr/>
-          <p:nvPr/>
-        </p:nvSpPr>
-        <p:spPr>
-          <a:xfrm>
-            <a:off x="2976155" y="3954763"/>
-            <a:ext cx="2464525" cy="826234"/>
-          </a:xfrm>
-          <a:prstGeom prst="ellipse">
-            <a:avLst/>
-          </a:prstGeom>
-          <a:noFill/>
-          <a:ln w="19050"/>
-        </p:spPr>
-        <p:style>
-          <a:lnRef idx="2">
-            <a:schemeClr val="accent1">
-              <a:shade val="50000"/>
-            </a:schemeClr>
-          </a:lnRef>
-          <a:fillRef idx="1">
-            <a:schemeClr val="accent1"/>
-          </a:fillRef>
-          <a:effectRef idx="0">
-            <a:schemeClr val="accent1"/>
-          </a:effectRef>
-          <a:fontRef idx="minor">
-            <a:schemeClr val="lt1"/>
-          </a:fontRef>
-        </p:style>
-        <p:txBody>
-          <a:bodyPr rtlCol="0" anchor="ctr"/>
-          <a:lstStyle/>
-          <a:p>
-            <a:pPr algn="ctr"/>
-            <a:r>
-              <a:rPr lang="he-IL" sz="1600" dirty="0">
-                <a:solidFill>
-                  <a:schemeClr val="tx1"/>
-                </a:solidFill>
-              </a:rPr>
-              <a:t>הפניה לחניון אלטרנטיבי</a:t>
-            </a:r>
-            <a:endParaRPr lang="en-US" sz="1600" dirty="0">
-              <a:solidFill>
-                <a:schemeClr val="tx1"/>
-              </a:solidFill>
-            </a:endParaRPr>
-          </a:p>
-        </p:txBody>
-      </p:sp>
-      <p:sp>
-        <p:nvSpPr>
-          <p:cNvPr id="31" name="Oval 30">
-            <a:extLst>
-              <a:ext uri="{FF2B5EF4-FFF2-40B4-BE49-F238E27FC236}">
-                <a16:creationId xmlns:a16="http://schemas.microsoft.com/office/drawing/2014/main" id="{2277AF84-69E5-469F-B6F2-73B76FA3B5AB}"/>
-              </a:ext>
-            </a:extLst>
-          </p:cNvPr>
-          <p:cNvSpPr/>
-          <p:nvPr/>
-        </p:nvSpPr>
-        <p:spPr>
-          <a:xfrm>
-            <a:off x="2976156" y="4887488"/>
-            <a:ext cx="2464525" cy="826234"/>
-          </a:xfrm>
-          <a:prstGeom prst="ellipse">
-            <a:avLst/>
-          </a:prstGeom>
-          <a:noFill/>
-          <a:ln w="19050"/>
-        </p:spPr>
-        <p:style>
-          <a:lnRef idx="2">
-            <a:schemeClr val="accent1">
-              <a:shade val="50000"/>
-            </a:schemeClr>
-          </a:lnRef>
-          <a:fillRef idx="1">
-            <a:schemeClr val="accent1"/>
-          </a:fillRef>
-          <a:effectRef idx="0">
-            <a:schemeClr val="accent1"/>
-          </a:effectRef>
-          <a:fontRef idx="minor">
-            <a:schemeClr val="lt1"/>
-          </a:fontRef>
-        </p:style>
-        <p:txBody>
-          <a:bodyPr rtlCol="0" anchor="ctr"/>
-          <a:lstStyle/>
-          <a:p>
-            <a:pPr algn="ctr"/>
-            <a:r>
-              <a:rPr lang="he-IL" sz="1600" dirty="0">
-                <a:solidFill>
-                  <a:schemeClr val="tx1"/>
-                </a:solidFill>
-              </a:rPr>
-              <a:t>אתחול המערכת</a:t>
-            </a:r>
-            <a:endParaRPr lang="en-US" sz="1600" dirty="0">
-              <a:solidFill>
-                <a:schemeClr val="tx1"/>
-              </a:solidFill>
-            </a:endParaRPr>
-          </a:p>
-        </p:txBody>
-      </p:sp>
-      <p:sp>
-        <p:nvSpPr>
-          <p:cNvPr id="32" name="Oval 31">
-            <a:extLst>
-              <a:ext uri="{FF2B5EF4-FFF2-40B4-BE49-F238E27FC236}">
-                <a16:creationId xmlns:a16="http://schemas.microsoft.com/office/drawing/2014/main" id="{C79244D2-C66F-477F-9F6A-27D04051C2F4}"/>
-              </a:ext>
-            </a:extLst>
-          </p:cNvPr>
-          <p:cNvSpPr/>
-          <p:nvPr/>
-        </p:nvSpPr>
-        <p:spPr>
-          <a:xfrm>
-            <a:off x="2976155" y="5820213"/>
-            <a:ext cx="2464525" cy="826234"/>
-          </a:xfrm>
-          <a:prstGeom prst="ellipse">
-            <a:avLst/>
-          </a:prstGeom>
-          <a:noFill/>
-          <a:ln w="19050"/>
-        </p:spPr>
-        <p:style>
-          <a:lnRef idx="2">
-            <a:schemeClr val="accent1">
-              <a:shade val="50000"/>
-            </a:schemeClr>
-          </a:lnRef>
-          <a:fillRef idx="1">
-            <a:schemeClr val="accent1"/>
-          </a:fillRef>
-          <a:effectRef idx="0">
-            <a:schemeClr val="accent1"/>
-          </a:effectRef>
-          <a:fontRef idx="minor">
-            <a:schemeClr val="lt1"/>
-          </a:fontRef>
-        </p:style>
-        <p:txBody>
-          <a:bodyPr rtlCol="0" anchor="ctr"/>
-          <a:lstStyle/>
-          <a:p>
-            <a:pPr algn="ctr"/>
-            <a:r>
-              <a:rPr lang="he-IL" sz="1600" dirty="0">
-                <a:solidFill>
-                  <a:schemeClr val="tx1"/>
-                </a:solidFill>
-              </a:rPr>
-              <a:t>שמירת מקומות חניה</a:t>
-            </a:r>
-            <a:endParaRPr lang="en-US" sz="1600" dirty="0">
-              <a:solidFill>
-                <a:schemeClr val="tx1"/>
-              </a:solidFill>
-            </a:endParaRPr>
-          </a:p>
-        </p:txBody>
-      </p:sp>
-      <p:grpSp>
-        <p:nvGrpSpPr>
-          <p:cNvPr id="33" name="Group 32">
-            <a:extLst>
-              <a:ext uri="{FF2B5EF4-FFF2-40B4-BE49-F238E27FC236}">
-                <a16:creationId xmlns:a16="http://schemas.microsoft.com/office/drawing/2014/main" id="{4CD04697-FB7C-4877-BBF7-5021E18A663E}"/>
-              </a:ext>
-            </a:extLst>
-          </p:cNvPr>
-          <p:cNvGrpSpPr/>
-          <p:nvPr/>
-        </p:nvGrpSpPr>
-        <p:grpSpPr>
-          <a:xfrm>
-            <a:off x="11032308" y="2089313"/>
-            <a:ext cx="844222" cy="1875451"/>
-            <a:chOff x="1763484" y="989045"/>
-            <a:chExt cx="1474239" cy="3275045"/>
-          </a:xfrm>
-        </p:grpSpPr>
-        <p:sp>
-          <p:nvSpPr>
-            <p:cNvPr id="34" name="Oval 33">
-              <a:extLst>
-                <a:ext uri="{FF2B5EF4-FFF2-40B4-BE49-F238E27FC236}">
-                  <a16:creationId xmlns:a16="http://schemas.microsoft.com/office/drawing/2014/main" id="{F211E7F4-4F22-41A7-ADAF-C82BDBC74575}"/>
-                </a:ext>
-              </a:extLst>
-            </p:cNvPr>
-            <p:cNvSpPr/>
-            <p:nvPr/>
-          </p:nvSpPr>
-          <p:spPr>
-            <a:xfrm>
-              <a:off x="2034074" y="989045"/>
-              <a:ext cx="933061" cy="933061"/>
-            </a:xfrm>
-            <a:prstGeom prst="ellipse">
-              <a:avLst/>
-            </a:prstGeom>
-            <a:noFill/>
-            <a:ln w="19050"/>
-          </p:spPr>
-          <p:style>
-            <a:lnRef idx="2">
-              <a:schemeClr val="accent1">
-                <a:shade val="50000"/>
-              </a:schemeClr>
-            </a:lnRef>
-            <a:fillRef idx="1">
-              <a:schemeClr val="accent1"/>
-            </a:fillRef>
-            <a:effectRef idx="0">
-              <a:schemeClr val="accent1"/>
-            </a:effectRef>
-            <a:fontRef idx="minor">
-              <a:schemeClr val="lt1"/>
-            </a:fontRef>
-          </p:style>
-          <p:txBody>
-            <a:bodyPr rtlCol="0" anchor="ctr"/>
-            <a:lstStyle/>
-            <a:p>
-              <a:pPr algn="ctr"/>
-              <a:endParaRPr lang="en-US">
-                <a:solidFill>
-                  <a:schemeClr val="tx1"/>
-                </a:solidFill>
-              </a:endParaRPr>
-            </a:p>
-          </p:txBody>
-        </p:sp>
-        <p:cxnSp>
-          <p:nvCxnSpPr>
-            <p:cNvPr id="35" name="Straight Connector 34">
-              <a:extLst>
-                <a:ext uri="{FF2B5EF4-FFF2-40B4-BE49-F238E27FC236}">
-                  <a16:creationId xmlns:a16="http://schemas.microsoft.com/office/drawing/2014/main" id="{047B8698-8265-4D52-9A8E-51F9172ED3EC}"/>
-                </a:ext>
-              </a:extLst>
-            </p:cNvPr>
-            <p:cNvCxnSpPr>
-              <a:cxnSpLocks/>
-              <a:stCxn id="34" idx="4"/>
-            </p:cNvCxnSpPr>
-            <p:nvPr/>
-          </p:nvCxnSpPr>
-          <p:spPr>
-            <a:xfrm>
-              <a:off x="2500605" y="1922106"/>
-              <a:ext cx="0" cy="1306286"/>
-            </a:xfrm>
-            <a:prstGeom prst="line">
-              <a:avLst/>
-            </a:prstGeom>
-            <a:ln w="19050"/>
-          </p:spPr>
-          <p:style>
-            <a:lnRef idx="1">
-              <a:schemeClr val="accent1"/>
-            </a:lnRef>
-            <a:fillRef idx="0">
-              <a:schemeClr val="accent1"/>
-            </a:fillRef>
-            <a:effectRef idx="0">
-              <a:schemeClr val="accent1"/>
-            </a:effectRef>
-            <a:fontRef idx="minor">
-              <a:schemeClr val="tx1"/>
-            </a:fontRef>
-          </p:style>
-        </p:cxnSp>
-        <p:cxnSp>
-          <p:nvCxnSpPr>
-            <p:cNvPr id="36" name="Straight Connector 35">
-              <a:extLst>
-                <a:ext uri="{FF2B5EF4-FFF2-40B4-BE49-F238E27FC236}">
-                  <a16:creationId xmlns:a16="http://schemas.microsoft.com/office/drawing/2014/main" id="{A924B83C-165F-432A-8ADB-3977884B6C94}"/>
-                </a:ext>
-              </a:extLst>
-            </p:cNvPr>
-            <p:cNvCxnSpPr>
-              <a:cxnSpLocks/>
-            </p:cNvCxnSpPr>
-            <p:nvPr/>
-          </p:nvCxnSpPr>
-          <p:spPr>
-            <a:xfrm flipH="1">
-              <a:off x="1763485" y="3228392"/>
-              <a:ext cx="737118" cy="1035698"/>
-            </a:xfrm>
-            <a:prstGeom prst="line">
-              <a:avLst/>
-            </a:prstGeom>
-            <a:ln w="19050"/>
-          </p:spPr>
-          <p:style>
-            <a:lnRef idx="1">
-              <a:schemeClr val="accent1"/>
-            </a:lnRef>
-            <a:fillRef idx="0">
-              <a:schemeClr val="accent1"/>
-            </a:fillRef>
-            <a:effectRef idx="0">
-              <a:schemeClr val="accent1"/>
-            </a:effectRef>
-            <a:fontRef idx="minor">
-              <a:schemeClr val="tx1"/>
-            </a:fontRef>
-          </p:style>
-        </p:cxnSp>
-        <p:cxnSp>
-          <p:nvCxnSpPr>
-            <p:cNvPr id="37" name="Straight Connector 36">
-              <a:extLst>
-                <a:ext uri="{FF2B5EF4-FFF2-40B4-BE49-F238E27FC236}">
-                  <a16:creationId xmlns:a16="http://schemas.microsoft.com/office/drawing/2014/main" id="{71123D99-C7B4-49FB-8A28-8F7C8F0AAE70}"/>
-                </a:ext>
-              </a:extLst>
-            </p:cNvPr>
-            <p:cNvCxnSpPr>
-              <a:cxnSpLocks/>
-            </p:cNvCxnSpPr>
-            <p:nvPr/>
-          </p:nvCxnSpPr>
-          <p:spPr>
-            <a:xfrm>
-              <a:off x="2500603" y="3228392"/>
-              <a:ext cx="737120" cy="1035698"/>
-            </a:xfrm>
-            <a:prstGeom prst="line">
-              <a:avLst/>
-            </a:prstGeom>
-            <a:ln w="19050"/>
-          </p:spPr>
-          <p:style>
-            <a:lnRef idx="1">
-              <a:schemeClr val="accent1"/>
-            </a:lnRef>
-            <a:fillRef idx="0">
-              <a:schemeClr val="accent1"/>
-            </a:fillRef>
-            <a:effectRef idx="0">
-              <a:schemeClr val="accent1"/>
-            </a:effectRef>
-            <a:fontRef idx="minor">
-              <a:schemeClr val="tx1"/>
-            </a:fontRef>
-          </p:style>
-        </p:cxnSp>
-        <p:cxnSp>
-          <p:nvCxnSpPr>
-            <p:cNvPr id="38" name="Straight Connector 37">
-              <a:extLst>
-                <a:ext uri="{FF2B5EF4-FFF2-40B4-BE49-F238E27FC236}">
-                  <a16:creationId xmlns:a16="http://schemas.microsoft.com/office/drawing/2014/main" id="{44D86F00-5987-48E6-83D1-C115F03EB2E5}"/>
-                </a:ext>
-              </a:extLst>
-            </p:cNvPr>
-            <p:cNvCxnSpPr>
-              <a:cxnSpLocks/>
-            </p:cNvCxnSpPr>
-            <p:nvPr/>
-          </p:nvCxnSpPr>
-          <p:spPr>
-            <a:xfrm>
-              <a:off x="1763484" y="2416623"/>
-              <a:ext cx="1474239" cy="0"/>
-            </a:xfrm>
-            <a:prstGeom prst="line">
-              <a:avLst/>
-            </a:prstGeom>
-            <a:ln w="19050"/>
-          </p:spPr>
-          <p:style>
-            <a:lnRef idx="1">
-              <a:schemeClr val="accent1"/>
-            </a:lnRef>
-            <a:fillRef idx="0">
-              <a:schemeClr val="accent1"/>
-            </a:fillRef>
-            <a:effectRef idx="0">
-              <a:schemeClr val="accent1"/>
-            </a:effectRef>
-            <a:fontRef idx="minor">
-              <a:schemeClr val="tx1"/>
-            </a:fontRef>
-          </p:style>
-        </p:cxnSp>
-      </p:grpSp>
-      <p:sp>
-        <p:nvSpPr>
-          <p:cNvPr id="39" name="TextBox 38">
-            <a:extLst>
-              <a:ext uri="{FF2B5EF4-FFF2-40B4-BE49-F238E27FC236}">
-                <a16:creationId xmlns:a16="http://schemas.microsoft.com/office/drawing/2014/main" id="{315A7FE3-8801-4FB4-96E9-94D0EBC4E511}"/>
-              </a:ext>
-            </a:extLst>
-          </p:cNvPr>
-          <p:cNvSpPr txBox="1"/>
-          <p:nvPr/>
-        </p:nvSpPr>
-        <p:spPr>
-          <a:xfrm>
-            <a:off x="10871863" y="4183214"/>
-            <a:ext cx="1165111" cy="369332"/>
-          </a:xfrm>
-          <a:prstGeom prst="rect">
-            <a:avLst/>
-          </a:prstGeom>
-          <a:noFill/>
-        </p:spPr>
-        <p:txBody>
-          <a:bodyPr wrap="square" rtlCol="0">
-            <a:spAutoFit/>
-          </a:bodyPr>
-          <a:lstStyle/>
-          <a:p>
-            <a:r>
-              <a:rPr lang="en-US" dirty="0"/>
-              <a:t>Customer</a:t>
-            </a:r>
-          </a:p>
-        </p:txBody>
-      </p:sp>
-      <p:sp>
-        <p:nvSpPr>
-          <p:cNvPr id="40" name="Oval 39">
-            <a:extLst>
-              <a:ext uri="{FF2B5EF4-FFF2-40B4-BE49-F238E27FC236}">
-                <a16:creationId xmlns:a16="http://schemas.microsoft.com/office/drawing/2014/main" id="{9552CC5E-76A5-46B6-AC8E-7A9C693A4CFD}"/>
-              </a:ext>
-            </a:extLst>
-          </p:cNvPr>
-          <p:cNvSpPr/>
-          <p:nvPr/>
-        </p:nvSpPr>
-        <p:spPr>
-          <a:xfrm>
-            <a:off x="7318280" y="1569705"/>
-            <a:ext cx="2464525" cy="826234"/>
-          </a:xfrm>
-          <a:prstGeom prst="ellipse">
-            <a:avLst/>
-          </a:prstGeom>
-          <a:noFill/>
-          <a:ln w="19050"/>
-        </p:spPr>
-        <p:style>
-          <a:lnRef idx="2">
-            <a:schemeClr val="accent1">
-              <a:shade val="50000"/>
-            </a:schemeClr>
-          </a:lnRef>
-          <a:fillRef idx="1">
-            <a:schemeClr val="accent1"/>
-          </a:fillRef>
-          <a:effectRef idx="0">
-            <a:schemeClr val="accent1"/>
-          </a:effectRef>
-          <a:fontRef idx="minor">
-            <a:schemeClr val="lt1"/>
-          </a:fontRef>
-        </p:style>
-        <p:txBody>
-          <a:bodyPr rtlCol="0" anchor="ctr"/>
-          <a:lstStyle/>
-          <a:p>
-            <a:pPr algn="ctr"/>
-            <a:r>
-              <a:rPr lang="he-IL" sz="1600" dirty="0">
-                <a:solidFill>
-                  <a:schemeClr val="tx1"/>
-                </a:solidFill>
-              </a:rPr>
-              <a:t>הזדהות במערכת</a:t>
-            </a:r>
-            <a:endParaRPr lang="en-US" sz="1600" dirty="0">
-              <a:solidFill>
-                <a:schemeClr val="tx1"/>
-              </a:solidFill>
-            </a:endParaRPr>
-          </a:p>
-        </p:txBody>
-      </p:sp>
-      <p:sp>
-        <p:nvSpPr>
-          <p:cNvPr id="41" name="Oval 40">
-            <a:extLst>
-              <a:ext uri="{FF2B5EF4-FFF2-40B4-BE49-F238E27FC236}">
-                <a16:creationId xmlns:a16="http://schemas.microsoft.com/office/drawing/2014/main" id="{67AB4161-3E09-43A8-B2CD-043805E8DBA7}"/>
-              </a:ext>
-            </a:extLst>
-          </p:cNvPr>
-          <p:cNvSpPr/>
-          <p:nvPr/>
-        </p:nvSpPr>
-        <p:spPr>
-          <a:xfrm>
-            <a:off x="7318280" y="2502430"/>
-            <a:ext cx="2464525" cy="826234"/>
-          </a:xfrm>
-          <a:prstGeom prst="ellipse">
-            <a:avLst/>
-          </a:prstGeom>
-          <a:noFill/>
-          <a:ln w="19050"/>
-        </p:spPr>
-        <p:style>
-          <a:lnRef idx="2">
-            <a:schemeClr val="accent1">
-              <a:shade val="50000"/>
-            </a:schemeClr>
-          </a:lnRef>
-          <a:fillRef idx="1">
-            <a:schemeClr val="accent1"/>
-          </a:fillRef>
-          <a:effectRef idx="0">
-            <a:schemeClr val="accent1"/>
-          </a:effectRef>
-          <a:fontRef idx="minor">
-            <a:schemeClr val="lt1"/>
-          </a:fontRef>
-        </p:style>
-        <p:txBody>
-          <a:bodyPr rtlCol="0" anchor="ctr"/>
-          <a:lstStyle/>
-          <a:p>
-            <a:pPr algn="ctr"/>
-            <a:r>
-              <a:rPr lang="he-IL" sz="1600" dirty="0">
-                <a:solidFill>
-                  <a:schemeClr val="tx1"/>
-                </a:solidFill>
-              </a:rPr>
-              <a:t>הזמנת שירותי חניה</a:t>
-            </a:r>
-            <a:endParaRPr lang="en-US" sz="1600" dirty="0">
-              <a:solidFill>
-                <a:schemeClr val="tx1"/>
-              </a:solidFill>
-            </a:endParaRPr>
-          </a:p>
-        </p:txBody>
-      </p:sp>
-      <p:sp>
-        <p:nvSpPr>
-          <p:cNvPr id="42" name="Oval 41">
-            <a:extLst>
-              <a:ext uri="{FF2B5EF4-FFF2-40B4-BE49-F238E27FC236}">
-                <a16:creationId xmlns:a16="http://schemas.microsoft.com/office/drawing/2014/main" id="{A3747C0C-0182-4CF1-AE3B-A9DCF3AD76C0}"/>
-              </a:ext>
-            </a:extLst>
-          </p:cNvPr>
-          <p:cNvSpPr/>
-          <p:nvPr/>
-        </p:nvSpPr>
-        <p:spPr>
-          <a:xfrm>
-            <a:off x="7318281" y="3435155"/>
-            <a:ext cx="2464525" cy="826234"/>
-          </a:xfrm>
-          <a:prstGeom prst="ellipse">
-            <a:avLst/>
-          </a:prstGeom>
-          <a:noFill/>
-          <a:ln w="19050"/>
-        </p:spPr>
-        <p:style>
-          <a:lnRef idx="2">
-            <a:schemeClr val="accent1">
-              <a:shade val="50000"/>
-            </a:schemeClr>
-          </a:lnRef>
-          <a:fillRef idx="1">
-            <a:schemeClr val="accent1"/>
-          </a:fillRef>
-          <a:effectRef idx="0">
-            <a:schemeClr val="accent1"/>
-          </a:effectRef>
-          <a:fontRef idx="minor">
-            <a:schemeClr val="lt1"/>
-          </a:fontRef>
-        </p:style>
-        <p:txBody>
-          <a:bodyPr rtlCol="0" anchor="ctr"/>
-          <a:lstStyle/>
-          <a:p>
-            <a:pPr algn="ctr"/>
-            <a:r>
-              <a:rPr lang="he-IL" sz="1600" dirty="0">
-                <a:solidFill>
-                  <a:schemeClr val="tx1"/>
-                </a:solidFill>
-              </a:rPr>
-              <a:t>מעקב על מצב בקשה</a:t>
-            </a:r>
-            <a:endParaRPr lang="en-US" sz="1600" dirty="0">
-              <a:solidFill>
-                <a:schemeClr val="tx1"/>
-              </a:solidFill>
-            </a:endParaRPr>
-          </a:p>
-        </p:txBody>
-      </p:sp>
-      <p:sp>
-        <p:nvSpPr>
-          <p:cNvPr id="43" name="Oval 42">
-            <a:extLst>
-              <a:ext uri="{FF2B5EF4-FFF2-40B4-BE49-F238E27FC236}">
-                <a16:creationId xmlns:a16="http://schemas.microsoft.com/office/drawing/2014/main" id="{3D149B52-5895-423A-BD19-010BFA27B380}"/>
-              </a:ext>
-            </a:extLst>
-          </p:cNvPr>
-          <p:cNvSpPr/>
-          <p:nvPr/>
-        </p:nvSpPr>
-        <p:spPr>
-          <a:xfrm>
-            <a:off x="7318280" y="4367880"/>
-            <a:ext cx="2464525" cy="826234"/>
-          </a:xfrm>
-          <a:prstGeom prst="ellipse">
-            <a:avLst/>
-          </a:prstGeom>
-          <a:noFill/>
-          <a:ln w="19050"/>
-        </p:spPr>
-        <p:style>
-          <a:lnRef idx="2">
-            <a:schemeClr val="accent1">
-              <a:shade val="50000"/>
-            </a:schemeClr>
-          </a:lnRef>
-          <a:fillRef idx="1">
-            <a:schemeClr val="accent1"/>
-          </a:fillRef>
-          <a:effectRef idx="0">
-            <a:schemeClr val="accent1"/>
-          </a:effectRef>
-          <a:fontRef idx="minor">
-            <a:schemeClr val="lt1"/>
-          </a:fontRef>
-        </p:style>
-        <p:txBody>
-          <a:bodyPr rot="0" spcFirstLastPara="0" vertOverflow="overflow" horzOverflow="overflow" vert="horz" wrap="square" lIns="91440" tIns="45720" rIns="91440" bIns="45720" numCol="1" spcCol="0" rtlCol="0" fromWordArt="0" anchor="ctr" anchorCtr="0" forceAA="0" compatLnSpc="1">
-            <a:prstTxWarp prst="textNoShape">
-              <a:avLst/>
-            </a:prstTxWarp>
-            <a:noAutofit/>
-          </a:bodyPr>
-          <a:lstStyle/>
-          <a:p>
-            <a:pPr algn="ctr"/>
-            <a:r>
-              <a:rPr lang="he-IL" sz="1600" dirty="0">
-                <a:solidFill>
-                  <a:schemeClr val="tx1"/>
-                </a:solidFill>
-              </a:rPr>
-              <a:t>הגשת תלונה</a:t>
-            </a:r>
-            <a:endParaRPr lang="en-US" sz="1600" dirty="0">
-              <a:solidFill>
-                <a:schemeClr val="tx1"/>
-              </a:solidFill>
-            </a:endParaRPr>
-          </a:p>
-        </p:txBody>
-      </p:sp>
-      <p:cxnSp>
-        <p:nvCxnSpPr>
-          <p:cNvPr id="45" name="Straight Connector 44">
-            <a:extLst>
-              <a:ext uri="{FF2B5EF4-FFF2-40B4-BE49-F238E27FC236}">
-                <a16:creationId xmlns:a16="http://schemas.microsoft.com/office/drawing/2014/main" id="{130D4541-4500-4303-B97B-7D8C3FED57E0}"/>
-              </a:ext>
-            </a:extLst>
-          </p:cNvPr>
-          <p:cNvCxnSpPr>
-            <a:cxnSpLocks/>
-            <a:endCxn id="23" idx="2"/>
-          </p:cNvCxnSpPr>
-          <p:nvPr/>
-        </p:nvCxnSpPr>
-        <p:spPr>
-          <a:xfrm flipV="1">
-            <a:off x="1589583" y="636980"/>
-            <a:ext cx="1386572" cy="1719751"/>
-          </a:xfrm>
-          <a:prstGeom prst="line">
-            <a:avLst/>
-          </a:prstGeom>
-        </p:spPr>
-        <p:style>
-          <a:lnRef idx="1">
-            <a:schemeClr val="accent1"/>
-          </a:lnRef>
-          <a:fillRef idx="0">
-            <a:schemeClr val="accent1"/>
-          </a:fillRef>
-          <a:effectRef idx="0">
-            <a:schemeClr val="accent1"/>
-          </a:effectRef>
-          <a:fontRef idx="minor">
-            <a:schemeClr val="tx1"/>
-          </a:fontRef>
-        </p:style>
-      </p:cxnSp>
-      <p:cxnSp>
-        <p:nvCxnSpPr>
-          <p:cNvPr id="47" name="Straight Connector 46">
-            <a:extLst>
-              <a:ext uri="{FF2B5EF4-FFF2-40B4-BE49-F238E27FC236}">
-                <a16:creationId xmlns:a16="http://schemas.microsoft.com/office/drawing/2014/main" id="{B9C35E75-7508-4BCC-BC07-8F17AD97E3BC}"/>
-              </a:ext>
-            </a:extLst>
-          </p:cNvPr>
-          <p:cNvCxnSpPr>
-            <a:cxnSpLocks/>
-            <a:endCxn id="24" idx="2"/>
-          </p:cNvCxnSpPr>
-          <p:nvPr/>
-        </p:nvCxnSpPr>
-        <p:spPr>
-          <a:xfrm flipV="1">
-            <a:off x="1589584" y="1569705"/>
-            <a:ext cx="1386571" cy="1114492"/>
-          </a:xfrm>
-          <a:prstGeom prst="line">
-            <a:avLst/>
-          </a:prstGeom>
-        </p:spPr>
-        <p:style>
-          <a:lnRef idx="1">
-            <a:schemeClr val="accent1"/>
-          </a:lnRef>
-          <a:fillRef idx="0">
-            <a:schemeClr val="accent1"/>
-          </a:fillRef>
-          <a:effectRef idx="0">
-            <a:schemeClr val="accent1"/>
-          </a:effectRef>
-          <a:fontRef idx="minor">
-            <a:schemeClr val="tx1"/>
-          </a:fontRef>
-        </p:style>
-      </p:cxnSp>
-      <p:cxnSp>
-        <p:nvCxnSpPr>
-          <p:cNvPr id="49" name="Straight Connector 48">
-            <a:extLst>
-              <a:ext uri="{FF2B5EF4-FFF2-40B4-BE49-F238E27FC236}">
-                <a16:creationId xmlns:a16="http://schemas.microsoft.com/office/drawing/2014/main" id="{80CB6942-C5F2-4436-B0F2-AF8EDE4E1B07}"/>
-              </a:ext>
-            </a:extLst>
-          </p:cNvPr>
-          <p:cNvCxnSpPr>
-            <a:endCxn id="25" idx="2"/>
-          </p:cNvCxnSpPr>
-          <p:nvPr/>
-        </p:nvCxnSpPr>
-        <p:spPr>
-          <a:xfrm flipV="1">
-            <a:off x="1589585" y="2502430"/>
-            <a:ext cx="1386571" cy="461997"/>
-          </a:xfrm>
-          <a:prstGeom prst="line">
-            <a:avLst/>
-          </a:prstGeom>
-        </p:spPr>
-        <p:style>
-          <a:lnRef idx="1">
-            <a:schemeClr val="accent1"/>
-          </a:lnRef>
-          <a:fillRef idx="0">
-            <a:schemeClr val="accent1"/>
-          </a:fillRef>
-          <a:effectRef idx="0">
-            <a:schemeClr val="accent1"/>
-          </a:effectRef>
-          <a:fontRef idx="minor">
-            <a:schemeClr val="tx1"/>
-          </a:fontRef>
-        </p:style>
-      </p:cxnSp>
-      <p:cxnSp>
-        <p:nvCxnSpPr>
-          <p:cNvPr id="51" name="Straight Connector 50">
-            <a:extLst>
-              <a:ext uri="{FF2B5EF4-FFF2-40B4-BE49-F238E27FC236}">
-                <a16:creationId xmlns:a16="http://schemas.microsoft.com/office/drawing/2014/main" id="{E6E0BED2-958E-4B98-B940-A02BCF290085}"/>
-              </a:ext>
-            </a:extLst>
-          </p:cNvPr>
-          <p:cNvCxnSpPr>
-            <a:endCxn id="26" idx="2"/>
-          </p:cNvCxnSpPr>
-          <p:nvPr/>
-        </p:nvCxnSpPr>
-        <p:spPr>
-          <a:xfrm>
-            <a:off x="1594892" y="3303872"/>
-            <a:ext cx="1381263" cy="131283"/>
-          </a:xfrm>
-          <a:prstGeom prst="line">
-            <a:avLst/>
-          </a:prstGeom>
-        </p:spPr>
-        <p:style>
-          <a:lnRef idx="1">
-            <a:schemeClr val="accent1"/>
-          </a:lnRef>
-          <a:fillRef idx="0">
-            <a:schemeClr val="accent1"/>
-          </a:fillRef>
-          <a:effectRef idx="0">
-            <a:schemeClr val="accent1"/>
-          </a:effectRef>
-          <a:fontRef idx="minor">
-            <a:schemeClr val="tx1"/>
-          </a:fontRef>
-        </p:style>
-      </p:cxnSp>
-      <p:cxnSp>
-        <p:nvCxnSpPr>
-          <p:cNvPr id="53" name="Straight Connector 52">
-            <a:extLst>
-              <a:ext uri="{FF2B5EF4-FFF2-40B4-BE49-F238E27FC236}">
-                <a16:creationId xmlns:a16="http://schemas.microsoft.com/office/drawing/2014/main" id="{22318DB8-288D-4D6F-A790-A61AB1B932FB}"/>
-              </a:ext>
-            </a:extLst>
-          </p:cNvPr>
-          <p:cNvCxnSpPr>
-            <a:endCxn id="30" idx="2"/>
-          </p:cNvCxnSpPr>
-          <p:nvPr/>
-        </p:nvCxnSpPr>
-        <p:spPr>
-          <a:xfrm>
-            <a:off x="1597545" y="3606482"/>
-            <a:ext cx="1378610" cy="761398"/>
-          </a:xfrm>
-          <a:prstGeom prst="line">
-            <a:avLst/>
-          </a:prstGeom>
-        </p:spPr>
-        <p:style>
-          <a:lnRef idx="1">
-            <a:schemeClr val="accent1"/>
-          </a:lnRef>
-          <a:fillRef idx="0">
-            <a:schemeClr val="accent1"/>
-          </a:fillRef>
-          <a:effectRef idx="0">
-            <a:schemeClr val="accent1"/>
-          </a:effectRef>
-          <a:fontRef idx="minor">
-            <a:schemeClr val="tx1"/>
-          </a:fontRef>
-        </p:style>
-      </p:cxnSp>
-      <p:cxnSp>
-        <p:nvCxnSpPr>
-          <p:cNvPr id="55" name="Straight Connector 54">
-            <a:extLst>
-              <a:ext uri="{FF2B5EF4-FFF2-40B4-BE49-F238E27FC236}">
-                <a16:creationId xmlns:a16="http://schemas.microsoft.com/office/drawing/2014/main" id="{BC167039-A387-43A1-A6A6-353E4F0F6529}"/>
-              </a:ext>
-            </a:extLst>
-          </p:cNvPr>
-          <p:cNvCxnSpPr/>
-          <p:nvPr/>
-        </p:nvCxnSpPr>
-        <p:spPr>
-          <a:xfrm>
-            <a:off x="1598871" y="3848272"/>
-            <a:ext cx="1377284" cy="1345842"/>
-          </a:xfrm>
-          <a:prstGeom prst="line">
-            <a:avLst/>
-          </a:prstGeom>
-        </p:spPr>
-        <p:style>
-          <a:lnRef idx="1">
-            <a:schemeClr val="accent1"/>
-          </a:lnRef>
-          <a:fillRef idx="0">
-            <a:schemeClr val="accent1"/>
-          </a:fillRef>
-          <a:effectRef idx="0">
-            <a:schemeClr val="accent1"/>
-          </a:effectRef>
-          <a:fontRef idx="minor">
-            <a:schemeClr val="tx1"/>
-          </a:fontRef>
-        </p:style>
-      </p:cxnSp>
-      <p:cxnSp>
-        <p:nvCxnSpPr>
-          <p:cNvPr id="57" name="Straight Connector 56">
-            <a:extLst>
-              <a:ext uri="{FF2B5EF4-FFF2-40B4-BE49-F238E27FC236}">
-                <a16:creationId xmlns:a16="http://schemas.microsoft.com/office/drawing/2014/main" id="{865386DD-4FBE-4394-AE40-EF21F5447C2C}"/>
-              </a:ext>
-            </a:extLst>
-          </p:cNvPr>
-          <p:cNvCxnSpPr>
-            <a:endCxn id="32" idx="2"/>
-          </p:cNvCxnSpPr>
-          <p:nvPr/>
-        </p:nvCxnSpPr>
-        <p:spPr>
-          <a:xfrm>
-            <a:off x="1597544" y="4130106"/>
-            <a:ext cx="1378611" cy="2103224"/>
-          </a:xfrm>
-          <a:prstGeom prst="line">
-            <a:avLst/>
-          </a:prstGeom>
-        </p:spPr>
-        <p:style>
-          <a:lnRef idx="1">
-            <a:schemeClr val="accent1"/>
-          </a:lnRef>
-          <a:fillRef idx="0">
-            <a:schemeClr val="accent1"/>
-          </a:fillRef>
-          <a:effectRef idx="0">
-            <a:schemeClr val="accent1"/>
-          </a:effectRef>
-          <a:fontRef idx="minor">
-            <a:schemeClr val="tx1"/>
-          </a:fontRef>
-        </p:style>
-      </p:cxnSp>
-      <p:cxnSp>
-        <p:nvCxnSpPr>
-          <p:cNvPr id="64" name="Straight Connector 63">
-            <a:extLst>
-              <a:ext uri="{FF2B5EF4-FFF2-40B4-BE49-F238E27FC236}">
-                <a16:creationId xmlns:a16="http://schemas.microsoft.com/office/drawing/2014/main" id="{CA55CB32-662E-45CF-91A4-F2B66298F504}"/>
-              </a:ext>
-            </a:extLst>
-          </p:cNvPr>
-          <p:cNvCxnSpPr>
-            <a:endCxn id="40" idx="6"/>
-          </p:cNvCxnSpPr>
-          <p:nvPr/>
-        </p:nvCxnSpPr>
-        <p:spPr>
-          <a:xfrm flipH="1" flipV="1">
-            <a:off x="9782805" y="1982822"/>
-            <a:ext cx="1168223" cy="701375"/>
-          </a:xfrm>
-          <a:prstGeom prst="line">
-            <a:avLst/>
-          </a:prstGeom>
-        </p:spPr>
-        <p:style>
-          <a:lnRef idx="1">
-            <a:schemeClr val="accent1"/>
-          </a:lnRef>
-          <a:fillRef idx="0">
-            <a:schemeClr val="accent1"/>
-          </a:fillRef>
-          <a:effectRef idx="0">
-            <a:schemeClr val="accent1"/>
-          </a:effectRef>
-          <a:fontRef idx="minor">
-            <a:schemeClr val="tx1"/>
-          </a:fontRef>
-        </p:style>
-      </p:cxnSp>
-      <p:cxnSp>
-        <p:nvCxnSpPr>
-          <p:cNvPr id="66" name="Straight Connector 65">
-            <a:extLst>
-              <a:ext uri="{FF2B5EF4-FFF2-40B4-BE49-F238E27FC236}">
-                <a16:creationId xmlns:a16="http://schemas.microsoft.com/office/drawing/2014/main" id="{D936EE4B-BA42-4FDE-989F-F7189A10A2C1}"/>
-              </a:ext>
-            </a:extLst>
-          </p:cNvPr>
-          <p:cNvCxnSpPr>
-            <a:endCxn id="41" idx="6"/>
-          </p:cNvCxnSpPr>
-          <p:nvPr/>
-        </p:nvCxnSpPr>
-        <p:spPr>
-          <a:xfrm flipH="1" flipV="1">
-            <a:off x="9782805" y="2915547"/>
-            <a:ext cx="1139803" cy="160188"/>
-          </a:xfrm>
-          <a:prstGeom prst="line">
-            <a:avLst/>
-          </a:prstGeom>
-        </p:spPr>
-        <p:style>
-          <a:lnRef idx="1">
-            <a:schemeClr val="accent1"/>
-          </a:lnRef>
-          <a:fillRef idx="0">
-            <a:schemeClr val="accent1"/>
-          </a:fillRef>
-          <a:effectRef idx="0">
-            <a:schemeClr val="accent1"/>
-          </a:effectRef>
-          <a:fontRef idx="minor">
-            <a:schemeClr val="tx1"/>
-          </a:fontRef>
-        </p:style>
-      </p:cxnSp>
-      <p:cxnSp>
-        <p:nvCxnSpPr>
-          <p:cNvPr id="68" name="Straight Connector 67">
-            <a:extLst>
-              <a:ext uri="{FF2B5EF4-FFF2-40B4-BE49-F238E27FC236}">
-                <a16:creationId xmlns:a16="http://schemas.microsoft.com/office/drawing/2014/main" id="{D1DDAC99-4A54-43C4-81C1-907C224E75F0}"/>
-              </a:ext>
-            </a:extLst>
-          </p:cNvPr>
-          <p:cNvCxnSpPr>
-            <a:endCxn id="42" idx="6"/>
-          </p:cNvCxnSpPr>
-          <p:nvPr/>
-        </p:nvCxnSpPr>
-        <p:spPr>
-          <a:xfrm flipH="1">
-            <a:off x="9782806" y="3353611"/>
-            <a:ext cx="1154012" cy="494661"/>
-          </a:xfrm>
-          <a:prstGeom prst="line">
-            <a:avLst/>
-          </a:prstGeom>
-        </p:spPr>
-        <p:style>
-          <a:lnRef idx="1">
-            <a:schemeClr val="accent1"/>
-          </a:lnRef>
-          <a:fillRef idx="0">
-            <a:schemeClr val="accent1"/>
-          </a:fillRef>
-          <a:effectRef idx="0">
-            <a:schemeClr val="accent1"/>
-          </a:effectRef>
-          <a:fontRef idx="minor">
-            <a:schemeClr val="tx1"/>
-          </a:fontRef>
-        </p:style>
-      </p:cxnSp>
-      <p:cxnSp>
-        <p:nvCxnSpPr>
-          <p:cNvPr id="70" name="Straight Connector 69">
-            <a:extLst>
-              <a:ext uri="{FF2B5EF4-FFF2-40B4-BE49-F238E27FC236}">
-                <a16:creationId xmlns:a16="http://schemas.microsoft.com/office/drawing/2014/main" id="{0E6343C5-D77D-40E2-8441-F41A0B4A59D2}"/>
-              </a:ext>
-            </a:extLst>
-          </p:cNvPr>
-          <p:cNvCxnSpPr>
-            <a:endCxn id="43" idx="6"/>
-          </p:cNvCxnSpPr>
-          <p:nvPr/>
-        </p:nvCxnSpPr>
-        <p:spPr>
-          <a:xfrm flipH="1">
-            <a:off x="9782805" y="3688084"/>
-            <a:ext cx="1139803" cy="1092913"/>
-          </a:xfrm>
-          <a:prstGeom prst="line">
-            <a:avLst/>
-          </a:prstGeom>
-        </p:spPr>
-        <p:style>
-          <a:lnRef idx="1">
-            <a:schemeClr val="accent1"/>
-          </a:lnRef>
-          <a:fillRef idx="0">
-            <a:schemeClr val="accent1"/>
-          </a:fillRef>
-          <a:effectRef idx="0">
-            <a:schemeClr val="accent1"/>
-          </a:effectRef>
-          <a:fontRef idx="minor">
-            <a:schemeClr val="tx1"/>
-          </a:fontRef>
-        </p:style>
-      </p:cxnSp>
-    </p:spTree>
-    <p:extLst>
-      <p:ext uri="{BB962C8B-B14F-4D97-AF65-F5344CB8AC3E}">
-        <p14:creationId xmlns:p14="http://schemas.microsoft.com/office/powerpoint/2010/main" val="2922493363"/>
-      </p:ext>
-    </p:extLst>
-  </p:cSld>
-  <p:clrMapOvr>
-    <a:masterClrMapping/>
-  </p:clrMapOvr>
-</p:sld>
-</file>
-
-<file path=ppt/slides/slide3.xml><?xml version="1.0" encoding="utf-8"?>
 <p:sld xmlns:a="http://schemas.openxmlformats.org/drawingml/2006/main" xmlns:r="http://schemas.openxmlformats.org/officeDocument/2006/relationships" xmlns:p="http://schemas.openxmlformats.org/presentationml/2006/main">
   <p:cSld>
     <p:spTree>

</xml_diff>